<commit_message>
actualizacion documento BD proyecto
</commit_message>
<xml_diff>
--- a/Proyecto BD proyecto_terminal.pptx
+++ b/Proyecto BD proyecto_terminal.pptx
@@ -3730,93 +3730,6 @@
           </a:p>
         </p:txBody>
       </p:sp>
-      <p:sp>
-        <p:nvSpPr>
-          <p:cNvPr id="16" name="Oval 4"/>
-          <p:cNvSpPr/>
-          <p:nvPr/>
-        </p:nvSpPr>
-        <p:spPr>
-          <a:xfrm>
-            <a:off x="251521" y="1268760"/>
-            <a:ext cx="720080" cy="720080"/>
-          </a:xfrm>
-          <a:prstGeom prst="ellipse">
-            <a:avLst/>
-          </a:prstGeom>
-          <a:solidFill>
-            <a:schemeClr val="accent1"/>
-          </a:solidFill>
-          <a:ln>
-            <a:noFill/>
-          </a:ln>
-        </p:spPr>
-        <p:style>
-          <a:lnRef idx="2">
-            <a:schemeClr val="accent1">
-              <a:shade val="50000"/>
-            </a:schemeClr>
-          </a:lnRef>
-          <a:fillRef idx="1">
-            <a:schemeClr val="accent1"/>
-          </a:fillRef>
-          <a:effectRef idx="0">
-            <a:schemeClr val="accent1"/>
-          </a:effectRef>
-          <a:fontRef idx="minor">
-            <a:schemeClr val="lt1"/>
-          </a:fontRef>
-        </p:style>
-        <p:txBody>
-          <a:bodyPr rtlCol="0" anchor="ctr"/>
-          <a:lstStyle/>
-          <a:p>
-            <a:pPr algn="ctr"/>
-            <a:endParaRPr lang="en-US"/>
-          </a:p>
-        </p:txBody>
-      </p:sp>
-      <p:sp>
-        <p:nvSpPr>
-          <p:cNvPr id="17" name="TextBox 21"/>
-          <p:cNvSpPr txBox="1"/>
-          <p:nvPr/>
-        </p:nvSpPr>
-        <p:spPr>
-          <a:xfrm>
-            <a:off x="251520" y="1397968"/>
-            <a:ext cx="720082" cy="461665"/>
-          </a:xfrm>
-          <a:prstGeom prst="rect">
-            <a:avLst/>
-          </a:prstGeom>
-          <a:noFill/>
-        </p:spPr>
-        <p:txBody>
-          <a:bodyPr wrap="square" rtlCol="0" anchor="ctr">
-            <a:spAutoFit/>
-          </a:bodyPr>
-          <a:lstStyle/>
-          <a:p>
-            <a:pPr algn="ctr"/>
-            <a:r>
-              <a:rPr lang="en-US" altLang="ko-KR" sz="2400" b="1" dirty="0" smtClean="0">
-                <a:solidFill>
-                  <a:schemeClr val="bg1"/>
-                </a:solidFill>
-                <a:cs typeface="Arial" pitchFamily="34" charset="0"/>
-              </a:rPr>
-              <a:t>05</a:t>
-            </a:r>
-            <a:endParaRPr lang="ko-KR" altLang="en-US" sz="2400" b="1" dirty="0">
-              <a:solidFill>
-                <a:schemeClr val="bg1"/>
-              </a:solidFill>
-              <a:cs typeface="Arial" pitchFamily="34" charset="0"/>
-            </a:endParaRPr>
-          </a:p>
-        </p:txBody>
-      </p:sp>
       <p:graphicFrame>
         <p:nvGraphicFramePr>
           <p:cNvPr id="2" name="Tabla 1"/>
@@ -4708,6 +4621,93 @@
           </a:p>
         </p:txBody>
       </p:sp>
+      <p:sp>
+        <p:nvSpPr>
+          <p:cNvPr id="13" name="Oval 4"/>
+          <p:cNvSpPr/>
+          <p:nvPr/>
+        </p:nvSpPr>
+        <p:spPr>
+          <a:xfrm>
+            <a:off x="359592" y="1340768"/>
+            <a:ext cx="540000" cy="540000"/>
+          </a:xfrm>
+          <a:prstGeom prst="ellipse">
+            <a:avLst/>
+          </a:prstGeom>
+          <a:solidFill>
+            <a:schemeClr val="accent1"/>
+          </a:solidFill>
+          <a:ln>
+            <a:noFill/>
+          </a:ln>
+        </p:spPr>
+        <p:style>
+          <a:lnRef idx="2">
+            <a:schemeClr val="accent1">
+              <a:shade val="50000"/>
+            </a:schemeClr>
+          </a:lnRef>
+          <a:fillRef idx="1">
+            <a:schemeClr val="accent1"/>
+          </a:fillRef>
+          <a:effectRef idx="0">
+            <a:schemeClr val="accent1"/>
+          </a:effectRef>
+          <a:fontRef idx="minor">
+            <a:schemeClr val="lt1"/>
+          </a:fontRef>
+        </p:style>
+        <p:txBody>
+          <a:bodyPr rtlCol="0" anchor="ctr"/>
+          <a:lstStyle/>
+          <a:p>
+            <a:pPr algn="ctr"/>
+            <a:endParaRPr lang="en-US"/>
+          </a:p>
+        </p:txBody>
+      </p:sp>
+      <p:sp>
+        <p:nvSpPr>
+          <p:cNvPr id="14" name="TextBox 21"/>
+          <p:cNvSpPr txBox="1"/>
+          <p:nvPr/>
+        </p:nvSpPr>
+        <p:spPr>
+          <a:xfrm>
+            <a:off x="359592" y="1379935"/>
+            <a:ext cx="540000" cy="461665"/>
+          </a:xfrm>
+          <a:prstGeom prst="rect">
+            <a:avLst/>
+          </a:prstGeom>
+          <a:noFill/>
+        </p:spPr>
+        <p:txBody>
+          <a:bodyPr wrap="square" rtlCol="0" anchor="ctr">
+            <a:spAutoFit/>
+          </a:bodyPr>
+          <a:lstStyle/>
+          <a:p>
+            <a:pPr algn="ctr"/>
+            <a:r>
+              <a:rPr lang="en-US" altLang="ko-KR" sz="2400" b="1" dirty="0" smtClean="0">
+                <a:solidFill>
+                  <a:schemeClr val="bg1"/>
+                </a:solidFill>
+                <a:cs typeface="Arial" pitchFamily="34" charset="0"/>
+              </a:rPr>
+              <a:t>05</a:t>
+            </a:r>
+            <a:endParaRPr lang="ko-KR" altLang="en-US" sz="2400" b="1" dirty="0">
+              <a:solidFill>
+                <a:schemeClr val="bg1"/>
+              </a:solidFill>
+              <a:cs typeface="Arial" pitchFamily="34" charset="0"/>
+            </a:endParaRPr>
+          </a:p>
+        </p:txBody>
+      </p:sp>
     </p:spTree>
     <p:extLst>
       <p:ext uri="{BB962C8B-B14F-4D97-AF65-F5344CB8AC3E}">
@@ -5441,93 +5441,6 @@
               </a:rPr>
               <a:t>al crudo o subproductos derivados de la destilación del crudo, entendiendo como crudo a la mezcla de hidrocarburos que existe en fase liquida y en reservorio bajo tierra y que permanece en fase liquida a presión atmosférica después de haber sido tratado en facilidades de separación superficial.</a:t>
             </a:r>
-          </a:p>
-        </p:txBody>
-      </p:sp>
-      <p:sp>
-        <p:nvSpPr>
-          <p:cNvPr id="16" name="Oval 4"/>
-          <p:cNvSpPr/>
-          <p:nvPr/>
-        </p:nvSpPr>
-        <p:spPr>
-          <a:xfrm>
-            <a:off x="251521" y="1268760"/>
-            <a:ext cx="720080" cy="720080"/>
-          </a:xfrm>
-          <a:prstGeom prst="ellipse">
-            <a:avLst/>
-          </a:prstGeom>
-          <a:solidFill>
-            <a:schemeClr val="accent1"/>
-          </a:solidFill>
-          <a:ln>
-            <a:noFill/>
-          </a:ln>
-        </p:spPr>
-        <p:style>
-          <a:lnRef idx="2">
-            <a:schemeClr val="accent1">
-              <a:shade val="50000"/>
-            </a:schemeClr>
-          </a:lnRef>
-          <a:fillRef idx="1">
-            <a:schemeClr val="accent1"/>
-          </a:fillRef>
-          <a:effectRef idx="0">
-            <a:schemeClr val="accent1"/>
-          </a:effectRef>
-          <a:fontRef idx="minor">
-            <a:schemeClr val="lt1"/>
-          </a:fontRef>
-        </p:style>
-        <p:txBody>
-          <a:bodyPr rtlCol="0" anchor="ctr"/>
-          <a:lstStyle/>
-          <a:p>
-            <a:pPr algn="ctr"/>
-            <a:endParaRPr lang="en-US"/>
-          </a:p>
-        </p:txBody>
-      </p:sp>
-      <p:sp>
-        <p:nvSpPr>
-          <p:cNvPr id="17" name="TextBox 21"/>
-          <p:cNvSpPr txBox="1"/>
-          <p:nvPr/>
-        </p:nvSpPr>
-        <p:spPr>
-          <a:xfrm>
-            <a:off x="251520" y="1397968"/>
-            <a:ext cx="720082" cy="461665"/>
-          </a:xfrm>
-          <a:prstGeom prst="rect">
-            <a:avLst/>
-          </a:prstGeom>
-          <a:noFill/>
-        </p:spPr>
-        <p:txBody>
-          <a:bodyPr wrap="square" rtlCol="0" anchor="ctr">
-            <a:spAutoFit/>
-          </a:bodyPr>
-          <a:lstStyle/>
-          <a:p>
-            <a:pPr algn="ctr"/>
-            <a:r>
-              <a:rPr lang="en-US" altLang="ko-KR" sz="2400" b="1" dirty="0" smtClean="0">
-                <a:solidFill>
-                  <a:schemeClr val="bg1"/>
-                </a:solidFill>
-                <a:cs typeface="Arial" pitchFamily="34" charset="0"/>
-              </a:rPr>
-              <a:t>05</a:t>
-            </a:r>
-            <a:endParaRPr lang="ko-KR" altLang="en-US" sz="2400" b="1" dirty="0">
-              <a:solidFill>
-                <a:schemeClr val="bg1"/>
-              </a:solidFill>
-              <a:cs typeface="Arial" pitchFamily="34" charset="0"/>
-            </a:endParaRPr>
           </a:p>
         </p:txBody>
       </p:sp>
@@ -6416,6 +6329,93 @@
           </a:p>
         </p:txBody>
       </p:sp>
+      <p:sp>
+        <p:nvSpPr>
+          <p:cNvPr id="13" name="Oval 4"/>
+          <p:cNvSpPr/>
+          <p:nvPr/>
+        </p:nvSpPr>
+        <p:spPr>
+          <a:xfrm>
+            <a:off x="359592" y="1340768"/>
+            <a:ext cx="540000" cy="540000"/>
+          </a:xfrm>
+          <a:prstGeom prst="ellipse">
+            <a:avLst/>
+          </a:prstGeom>
+          <a:solidFill>
+            <a:schemeClr val="accent1"/>
+          </a:solidFill>
+          <a:ln>
+            <a:noFill/>
+          </a:ln>
+        </p:spPr>
+        <p:style>
+          <a:lnRef idx="2">
+            <a:schemeClr val="accent1">
+              <a:shade val="50000"/>
+            </a:schemeClr>
+          </a:lnRef>
+          <a:fillRef idx="1">
+            <a:schemeClr val="accent1"/>
+          </a:fillRef>
+          <a:effectRef idx="0">
+            <a:schemeClr val="accent1"/>
+          </a:effectRef>
+          <a:fontRef idx="minor">
+            <a:schemeClr val="lt1"/>
+          </a:fontRef>
+        </p:style>
+        <p:txBody>
+          <a:bodyPr rtlCol="0" anchor="ctr"/>
+          <a:lstStyle/>
+          <a:p>
+            <a:pPr algn="ctr"/>
+            <a:endParaRPr lang="en-US"/>
+          </a:p>
+        </p:txBody>
+      </p:sp>
+      <p:sp>
+        <p:nvSpPr>
+          <p:cNvPr id="14" name="TextBox 21"/>
+          <p:cNvSpPr txBox="1"/>
+          <p:nvPr/>
+        </p:nvSpPr>
+        <p:spPr>
+          <a:xfrm>
+            <a:off x="359592" y="1379935"/>
+            <a:ext cx="540000" cy="461665"/>
+          </a:xfrm>
+          <a:prstGeom prst="rect">
+            <a:avLst/>
+          </a:prstGeom>
+          <a:noFill/>
+        </p:spPr>
+        <p:txBody>
+          <a:bodyPr wrap="square" rtlCol="0" anchor="ctr">
+            <a:spAutoFit/>
+          </a:bodyPr>
+          <a:lstStyle/>
+          <a:p>
+            <a:pPr algn="ctr"/>
+            <a:r>
+              <a:rPr lang="en-US" altLang="ko-KR" sz="2400" b="1" dirty="0" smtClean="0">
+                <a:solidFill>
+                  <a:schemeClr val="bg1"/>
+                </a:solidFill>
+                <a:cs typeface="Arial" pitchFamily="34" charset="0"/>
+              </a:rPr>
+              <a:t>05</a:t>
+            </a:r>
+            <a:endParaRPr lang="ko-KR" altLang="en-US" sz="2400" b="1" dirty="0">
+              <a:solidFill>
+                <a:schemeClr val="bg1"/>
+              </a:solidFill>
+              <a:cs typeface="Arial" pitchFamily="34" charset="0"/>
+            </a:endParaRPr>
+          </a:p>
+        </p:txBody>
+      </p:sp>
     </p:spTree>
     <p:extLst>
       <p:ext uri="{BB962C8B-B14F-4D97-AF65-F5344CB8AC3E}">
@@ -7048,93 +7048,6 @@
               </a:rPr>
               <a:t>a la clasificación del crudo (liviano o mediano) o crudo mejorado.</a:t>
             </a:r>
-          </a:p>
-        </p:txBody>
-      </p:sp>
-      <p:sp>
-        <p:nvSpPr>
-          <p:cNvPr id="16" name="Oval 4"/>
-          <p:cNvSpPr/>
-          <p:nvPr/>
-        </p:nvSpPr>
-        <p:spPr>
-          <a:xfrm>
-            <a:off x="251521" y="1268760"/>
-            <a:ext cx="720080" cy="720080"/>
-          </a:xfrm>
-          <a:prstGeom prst="ellipse">
-            <a:avLst/>
-          </a:prstGeom>
-          <a:solidFill>
-            <a:schemeClr val="accent1"/>
-          </a:solidFill>
-          <a:ln>
-            <a:noFill/>
-          </a:ln>
-        </p:spPr>
-        <p:style>
-          <a:lnRef idx="2">
-            <a:schemeClr val="accent1">
-              <a:shade val="50000"/>
-            </a:schemeClr>
-          </a:lnRef>
-          <a:fillRef idx="1">
-            <a:schemeClr val="accent1"/>
-          </a:fillRef>
-          <a:effectRef idx="0">
-            <a:schemeClr val="accent1"/>
-          </a:effectRef>
-          <a:fontRef idx="minor">
-            <a:schemeClr val="lt1"/>
-          </a:fontRef>
-        </p:style>
-        <p:txBody>
-          <a:bodyPr rtlCol="0" anchor="ctr"/>
-          <a:lstStyle/>
-          <a:p>
-            <a:pPr algn="ctr"/>
-            <a:endParaRPr lang="en-US"/>
-          </a:p>
-        </p:txBody>
-      </p:sp>
-      <p:sp>
-        <p:nvSpPr>
-          <p:cNvPr id="17" name="TextBox 21"/>
-          <p:cNvSpPr txBox="1"/>
-          <p:nvPr/>
-        </p:nvSpPr>
-        <p:spPr>
-          <a:xfrm>
-            <a:off x="251520" y="1397968"/>
-            <a:ext cx="720082" cy="461665"/>
-          </a:xfrm>
-          <a:prstGeom prst="rect">
-            <a:avLst/>
-          </a:prstGeom>
-          <a:noFill/>
-        </p:spPr>
-        <p:txBody>
-          <a:bodyPr wrap="square" rtlCol="0" anchor="ctr">
-            <a:spAutoFit/>
-          </a:bodyPr>
-          <a:lstStyle/>
-          <a:p>
-            <a:pPr algn="ctr"/>
-            <a:r>
-              <a:rPr lang="en-US" altLang="ko-KR" sz="2400" b="1" dirty="0" smtClean="0">
-                <a:solidFill>
-                  <a:schemeClr val="bg1"/>
-                </a:solidFill>
-                <a:cs typeface="Arial" pitchFamily="34" charset="0"/>
-              </a:rPr>
-              <a:t>06</a:t>
-            </a:r>
-            <a:endParaRPr lang="ko-KR" altLang="en-US" sz="2400" b="1" dirty="0">
-              <a:solidFill>
-                <a:schemeClr val="bg1"/>
-              </a:solidFill>
-              <a:cs typeface="Arial" pitchFamily="34" charset="0"/>
-            </a:endParaRPr>
           </a:p>
         </p:txBody>
       </p:sp>
@@ -7754,6 +7667,93 @@
           </a:p>
         </p:txBody>
       </p:sp>
+      <p:sp>
+        <p:nvSpPr>
+          <p:cNvPr id="11" name="Oval 4"/>
+          <p:cNvSpPr/>
+          <p:nvPr/>
+        </p:nvSpPr>
+        <p:spPr>
+          <a:xfrm>
+            <a:off x="395536" y="1340768"/>
+            <a:ext cx="540000" cy="540000"/>
+          </a:xfrm>
+          <a:prstGeom prst="ellipse">
+            <a:avLst/>
+          </a:prstGeom>
+          <a:solidFill>
+            <a:schemeClr val="accent1"/>
+          </a:solidFill>
+          <a:ln>
+            <a:noFill/>
+          </a:ln>
+        </p:spPr>
+        <p:style>
+          <a:lnRef idx="2">
+            <a:schemeClr val="accent1">
+              <a:shade val="50000"/>
+            </a:schemeClr>
+          </a:lnRef>
+          <a:fillRef idx="1">
+            <a:schemeClr val="accent1"/>
+          </a:fillRef>
+          <a:effectRef idx="0">
+            <a:schemeClr val="accent1"/>
+          </a:effectRef>
+          <a:fontRef idx="minor">
+            <a:schemeClr val="lt1"/>
+          </a:fontRef>
+        </p:style>
+        <p:txBody>
+          <a:bodyPr rtlCol="0" anchor="ctr"/>
+          <a:lstStyle/>
+          <a:p>
+            <a:pPr algn="ctr"/>
+            <a:endParaRPr lang="en-US"/>
+          </a:p>
+        </p:txBody>
+      </p:sp>
+      <p:sp>
+        <p:nvSpPr>
+          <p:cNvPr id="12" name="TextBox 21"/>
+          <p:cNvSpPr txBox="1"/>
+          <p:nvPr/>
+        </p:nvSpPr>
+        <p:spPr>
+          <a:xfrm>
+            <a:off x="395536" y="1379935"/>
+            <a:ext cx="540000" cy="461665"/>
+          </a:xfrm>
+          <a:prstGeom prst="rect">
+            <a:avLst/>
+          </a:prstGeom>
+          <a:noFill/>
+        </p:spPr>
+        <p:txBody>
+          <a:bodyPr wrap="square" rtlCol="0" anchor="ctr">
+            <a:spAutoFit/>
+          </a:bodyPr>
+          <a:lstStyle/>
+          <a:p>
+            <a:pPr algn="ctr"/>
+            <a:r>
+              <a:rPr lang="en-US" altLang="ko-KR" sz="2400" b="1" dirty="0" smtClean="0">
+                <a:solidFill>
+                  <a:schemeClr val="bg1"/>
+                </a:solidFill>
+                <a:cs typeface="Arial" pitchFamily="34" charset="0"/>
+              </a:rPr>
+              <a:t>06</a:t>
+            </a:r>
+            <a:endParaRPr lang="ko-KR" altLang="en-US" sz="2400" b="1" dirty="0">
+              <a:solidFill>
+                <a:schemeClr val="bg1"/>
+              </a:solidFill>
+              <a:cs typeface="Arial" pitchFamily="34" charset="0"/>
+            </a:endParaRPr>
+          </a:p>
+        </p:txBody>
+      </p:sp>
     </p:spTree>
     <p:extLst>
       <p:ext uri="{BB962C8B-B14F-4D97-AF65-F5344CB8AC3E}">
@@ -8424,93 +8424,6 @@
               <a:solidFill>
                 <a:schemeClr val="tx1"/>
               </a:solidFill>
-            </a:endParaRPr>
-          </a:p>
-        </p:txBody>
-      </p:sp>
-      <p:sp>
-        <p:nvSpPr>
-          <p:cNvPr id="16" name="Oval 4"/>
-          <p:cNvSpPr/>
-          <p:nvPr/>
-        </p:nvSpPr>
-        <p:spPr>
-          <a:xfrm>
-            <a:off x="251521" y="1268760"/>
-            <a:ext cx="720080" cy="720080"/>
-          </a:xfrm>
-          <a:prstGeom prst="ellipse">
-            <a:avLst/>
-          </a:prstGeom>
-          <a:solidFill>
-            <a:schemeClr val="accent1"/>
-          </a:solidFill>
-          <a:ln>
-            <a:noFill/>
-          </a:ln>
-        </p:spPr>
-        <p:style>
-          <a:lnRef idx="2">
-            <a:schemeClr val="accent1">
-              <a:shade val="50000"/>
-            </a:schemeClr>
-          </a:lnRef>
-          <a:fillRef idx="1">
-            <a:schemeClr val="accent1"/>
-          </a:fillRef>
-          <a:effectRef idx="0">
-            <a:schemeClr val="accent1"/>
-          </a:effectRef>
-          <a:fontRef idx="minor">
-            <a:schemeClr val="lt1"/>
-          </a:fontRef>
-        </p:style>
-        <p:txBody>
-          <a:bodyPr rtlCol="0" anchor="ctr"/>
-          <a:lstStyle/>
-          <a:p>
-            <a:pPr algn="ctr"/>
-            <a:endParaRPr lang="en-US"/>
-          </a:p>
-        </p:txBody>
-      </p:sp>
-      <p:sp>
-        <p:nvSpPr>
-          <p:cNvPr id="17" name="TextBox 21"/>
-          <p:cNvSpPr txBox="1"/>
-          <p:nvPr/>
-        </p:nvSpPr>
-        <p:spPr>
-          <a:xfrm>
-            <a:off x="251520" y="1397968"/>
-            <a:ext cx="720082" cy="461665"/>
-          </a:xfrm>
-          <a:prstGeom prst="rect">
-            <a:avLst/>
-          </a:prstGeom>
-          <a:noFill/>
-        </p:spPr>
-        <p:txBody>
-          <a:bodyPr wrap="square" rtlCol="0" anchor="ctr">
-            <a:spAutoFit/>
-          </a:bodyPr>
-          <a:lstStyle/>
-          <a:p>
-            <a:pPr algn="ctr"/>
-            <a:r>
-              <a:rPr lang="en-US" altLang="ko-KR" sz="2400" b="1" dirty="0" smtClean="0">
-                <a:solidFill>
-                  <a:schemeClr val="bg1"/>
-                </a:solidFill>
-                <a:cs typeface="Arial" pitchFamily="34" charset="0"/>
-              </a:rPr>
-              <a:t>07</a:t>
-            </a:r>
-            <a:endParaRPr lang="ko-KR" altLang="en-US" sz="2400" b="1" dirty="0">
-              <a:solidFill>
-                <a:schemeClr val="bg1"/>
-              </a:solidFill>
-              <a:cs typeface="Arial" pitchFamily="34" charset="0"/>
             </a:endParaRPr>
           </a:p>
         </p:txBody>
@@ -9362,6 +9275,93 @@
           </a:p>
         </p:txBody>
       </p:sp>
+      <p:sp>
+        <p:nvSpPr>
+          <p:cNvPr id="11" name="Oval 4"/>
+          <p:cNvSpPr/>
+          <p:nvPr/>
+        </p:nvSpPr>
+        <p:spPr>
+          <a:xfrm>
+            <a:off x="395536" y="1340768"/>
+            <a:ext cx="540000" cy="540000"/>
+          </a:xfrm>
+          <a:prstGeom prst="ellipse">
+            <a:avLst/>
+          </a:prstGeom>
+          <a:solidFill>
+            <a:schemeClr val="accent1"/>
+          </a:solidFill>
+          <a:ln>
+            <a:noFill/>
+          </a:ln>
+        </p:spPr>
+        <p:style>
+          <a:lnRef idx="2">
+            <a:schemeClr val="accent1">
+              <a:shade val="50000"/>
+            </a:schemeClr>
+          </a:lnRef>
+          <a:fillRef idx="1">
+            <a:schemeClr val="accent1"/>
+          </a:fillRef>
+          <a:effectRef idx="0">
+            <a:schemeClr val="accent1"/>
+          </a:effectRef>
+          <a:fontRef idx="minor">
+            <a:schemeClr val="lt1"/>
+          </a:fontRef>
+        </p:style>
+        <p:txBody>
+          <a:bodyPr rtlCol="0" anchor="ctr"/>
+          <a:lstStyle/>
+          <a:p>
+            <a:pPr algn="ctr"/>
+            <a:endParaRPr lang="en-US"/>
+          </a:p>
+        </p:txBody>
+      </p:sp>
+      <p:sp>
+        <p:nvSpPr>
+          <p:cNvPr id="12" name="TextBox 21"/>
+          <p:cNvSpPr txBox="1"/>
+          <p:nvPr/>
+        </p:nvSpPr>
+        <p:spPr>
+          <a:xfrm>
+            <a:off x="395536" y="1379935"/>
+            <a:ext cx="540000" cy="461665"/>
+          </a:xfrm>
+          <a:prstGeom prst="rect">
+            <a:avLst/>
+          </a:prstGeom>
+          <a:noFill/>
+        </p:spPr>
+        <p:txBody>
+          <a:bodyPr wrap="square" rtlCol="0" anchor="ctr">
+            <a:spAutoFit/>
+          </a:bodyPr>
+          <a:lstStyle/>
+          <a:p>
+            <a:pPr algn="ctr"/>
+            <a:r>
+              <a:rPr lang="en-US" altLang="ko-KR" sz="2400" b="1" dirty="0" smtClean="0">
+                <a:solidFill>
+                  <a:schemeClr val="bg1"/>
+                </a:solidFill>
+                <a:cs typeface="Arial" pitchFamily="34" charset="0"/>
+              </a:rPr>
+              <a:t>07</a:t>
+            </a:r>
+            <a:endParaRPr lang="ko-KR" altLang="en-US" sz="2400" b="1" dirty="0">
+              <a:solidFill>
+                <a:schemeClr val="bg1"/>
+              </a:solidFill>
+              <a:cs typeface="Arial" pitchFamily="34" charset="0"/>
+            </a:endParaRPr>
+          </a:p>
+        </p:txBody>
+      </p:sp>
     </p:spTree>
     <p:extLst>
       <p:ext uri="{BB962C8B-B14F-4D97-AF65-F5344CB8AC3E}">
@@ -10129,93 +10129,6 @@
               <a:solidFill>
                 <a:schemeClr val="tx1"/>
               </a:solidFill>
-            </a:endParaRPr>
-          </a:p>
-        </p:txBody>
-      </p:sp>
-      <p:sp>
-        <p:nvSpPr>
-          <p:cNvPr id="16" name="Oval 4"/>
-          <p:cNvSpPr/>
-          <p:nvPr/>
-        </p:nvSpPr>
-        <p:spPr>
-          <a:xfrm>
-            <a:off x="251521" y="1268760"/>
-            <a:ext cx="720080" cy="720080"/>
-          </a:xfrm>
-          <a:prstGeom prst="ellipse">
-            <a:avLst/>
-          </a:prstGeom>
-          <a:solidFill>
-            <a:schemeClr val="accent1"/>
-          </a:solidFill>
-          <a:ln>
-            <a:noFill/>
-          </a:ln>
-        </p:spPr>
-        <p:style>
-          <a:lnRef idx="2">
-            <a:schemeClr val="accent1">
-              <a:shade val="50000"/>
-            </a:schemeClr>
-          </a:lnRef>
-          <a:fillRef idx="1">
-            <a:schemeClr val="accent1"/>
-          </a:fillRef>
-          <a:effectRef idx="0">
-            <a:schemeClr val="accent1"/>
-          </a:effectRef>
-          <a:fontRef idx="minor">
-            <a:schemeClr val="lt1"/>
-          </a:fontRef>
-        </p:style>
-        <p:txBody>
-          <a:bodyPr rtlCol="0" anchor="ctr"/>
-          <a:lstStyle/>
-          <a:p>
-            <a:pPr algn="ctr"/>
-            <a:endParaRPr lang="en-US"/>
-          </a:p>
-        </p:txBody>
-      </p:sp>
-      <p:sp>
-        <p:nvSpPr>
-          <p:cNvPr id="17" name="TextBox 21"/>
-          <p:cNvSpPr txBox="1"/>
-          <p:nvPr/>
-        </p:nvSpPr>
-        <p:spPr>
-          <a:xfrm>
-            <a:off x="251520" y="1397968"/>
-            <a:ext cx="720082" cy="461665"/>
-          </a:xfrm>
-          <a:prstGeom prst="rect">
-            <a:avLst/>
-          </a:prstGeom>
-          <a:noFill/>
-        </p:spPr>
-        <p:txBody>
-          <a:bodyPr wrap="square" rtlCol="0" anchor="ctr">
-            <a:spAutoFit/>
-          </a:bodyPr>
-          <a:lstStyle/>
-          <a:p>
-            <a:pPr algn="ctr"/>
-            <a:r>
-              <a:rPr lang="en-US" altLang="ko-KR" sz="2400" b="1" dirty="0" smtClean="0">
-                <a:solidFill>
-                  <a:schemeClr val="bg1"/>
-                </a:solidFill>
-                <a:cs typeface="Arial" pitchFamily="34" charset="0"/>
-              </a:rPr>
-              <a:t>08</a:t>
-            </a:r>
-            <a:endParaRPr lang="ko-KR" altLang="en-US" sz="2400" b="1" dirty="0">
-              <a:solidFill>
-                <a:schemeClr val="bg1"/>
-              </a:solidFill>
-              <a:cs typeface="Arial" pitchFamily="34" charset="0"/>
             </a:endParaRPr>
           </a:p>
         </p:txBody>
@@ -11750,6 +11663,93 @@
             </a:r>
             <a:endParaRPr lang="en-US" sz="2400" b="1" dirty="0">
               <a:latin typeface="Tahoma" charset="0"/>
+            </a:endParaRPr>
+          </a:p>
+        </p:txBody>
+      </p:sp>
+      <p:sp>
+        <p:nvSpPr>
+          <p:cNvPr id="13" name="Oval 4"/>
+          <p:cNvSpPr/>
+          <p:nvPr/>
+        </p:nvSpPr>
+        <p:spPr>
+          <a:xfrm>
+            <a:off x="395536" y="1340768"/>
+            <a:ext cx="540000" cy="540000"/>
+          </a:xfrm>
+          <a:prstGeom prst="ellipse">
+            <a:avLst/>
+          </a:prstGeom>
+          <a:solidFill>
+            <a:schemeClr val="accent1"/>
+          </a:solidFill>
+          <a:ln>
+            <a:noFill/>
+          </a:ln>
+        </p:spPr>
+        <p:style>
+          <a:lnRef idx="2">
+            <a:schemeClr val="accent1">
+              <a:shade val="50000"/>
+            </a:schemeClr>
+          </a:lnRef>
+          <a:fillRef idx="1">
+            <a:schemeClr val="accent1"/>
+          </a:fillRef>
+          <a:effectRef idx="0">
+            <a:schemeClr val="accent1"/>
+          </a:effectRef>
+          <a:fontRef idx="minor">
+            <a:schemeClr val="lt1"/>
+          </a:fontRef>
+        </p:style>
+        <p:txBody>
+          <a:bodyPr rtlCol="0" anchor="ctr"/>
+          <a:lstStyle/>
+          <a:p>
+            <a:pPr algn="ctr"/>
+            <a:endParaRPr lang="en-US"/>
+          </a:p>
+        </p:txBody>
+      </p:sp>
+      <p:sp>
+        <p:nvSpPr>
+          <p:cNvPr id="14" name="TextBox 21"/>
+          <p:cNvSpPr txBox="1"/>
+          <p:nvPr/>
+        </p:nvSpPr>
+        <p:spPr>
+          <a:xfrm>
+            <a:off x="395536" y="1379935"/>
+            <a:ext cx="540000" cy="461665"/>
+          </a:xfrm>
+          <a:prstGeom prst="rect">
+            <a:avLst/>
+          </a:prstGeom>
+          <a:noFill/>
+        </p:spPr>
+        <p:txBody>
+          <a:bodyPr wrap="square" rtlCol="0" anchor="ctr">
+            <a:spAutoFit/>
+          </a:bodyPr>
+          <a:lstStyle/>
+          <a:p>
+            <a:pPr algn="ctr"/>
+            <a:r>
+              <a:rPr lang="en-US" altLang="ko-KR" sz="2400" b="1" dirty="0" smtClean="0">
+                <a:solidFill>
+                  <a:schemeClr val="bg1"/>
+                </a:solidFill>
+                <a:cs typeface="Arial" pitchFamily="34" charset="0"/>
+              </a:rPr>
+              <a:t>08</a:t>
+            </a:r>
+            <a:endParaRPr lang="ko-KR" altLang="en-US" sz="2400" b="1" dirty="0">
+              <a:solidFill>
+                <a:schemeClr val="bg1"/>
+              </a:solidFill>
+              <a:cs typeface="Arial" pitchFamily="34" charset="0"/>
             </a:endParaRPr>
           </a:p>
         </p:txBody>
@@ -12660,93 +12660,6 @@
           </a:p>
         </p:txBody>
       </p:sp>
-      <p:sp>
-        <p:nvSpPr>
-          <p:cNvPr id="16" name="Oval 4"/>
-          <p:cNvSpPr/>
-          <p:nvPr/>
-        </p:nvSpPr>
-        <p:spPr>
-          <a:xfrm>
-            <a:off x="251521" y="1268760"/>
-            <a:ext cx="720080" cy="720080"/>
-          </a:xfrm>
-          <a:prstGeom prst="ellipse">
-            <a:avLst/>
-          </a:prstGeom>
-          <a:solidFill>
-            <a:schemeClr val="accent1"/>
-          </a:solidFill>
-          <a:ln>
-            <a:noFill/>
-          </a:ln>
-        </p:spPr>
-        <p:style>
-          <a:lnRef idx="2">
-            <a:schemeClr val="accent1">
-              <a:shade val="50000"/>
-            </a:schemeClr>
-          </a:lnRef>
-          <a:fillRef idx="1">
-            <a:schemeClr val="accent1"/>
-          </a:fillRef>
-          <a:effectRef idx="0">
-            <a:schemeClr val="accent1"/>
-          </a:effectRef>
-          <a:fontRef idx="minor">
-            <a:schemeClr val="lt1"/>
-          </a:fontRef>
-        </p:style>
-        <p:txBody>
-          <a:bodyPr rtlCol="0" anchor="ctr"/>
-          <a:lstStyle/>
-          <a:p>
-            <a:pPr algn="ctr"/>
-            <a:endParaRPr lang="en-US"/>
-          </a:p>
-        </p:txBody>
-      </p:sp>
-      <p:sp>
-        <p:nvSpPr>
-          <p:cNvPr id="17" name="TextBox 21"/>
-          <p:cNvSpPr txBox="1"/>
-          <p:nvPr/>
-        </p:nvSpPr>
-        <p:spPr>
-          <a:xfrm>
-            <a:off x="251520" y="1397968"/>
-            <a:ext cx="720082" cy="461665"/>
-          </a:xfrm>
-          <a:prstGeom prst="rect">
-            <a:avLst/>
-          </a:prstGeom>
-          <a:noFill/>
-        </p:spPr>
-        <p:txBody>
-          <a:bodyPr wrap="square" rtlCol="0" anchor="ctr">
-            <a:spAutoFit/>
-          </a:bodyPr>
-          <a:lstStyle/>
-          <a:p>
-            <a:pPr algn="ctr"/>
-            <a:r>
-              <a:rPr lang="en-US" altLang="ko-KR" sz="2400" b="1" dirty="0" smtClean="0">
-                <a:solidFill>
-                  <a:schemeClr val="bg1"/>
-                </a:solidFill>
-                <a:cs typeface="Arial" pitchFamily="34" charset="0"/>
-              </a:rPr>
-              <a:t>08</a:t>
-            </a:r>
-            <a:endParaRPr lang="ko-KR" altLang="en-US" sz="2400" b="1" dirty="0">
-              <a:solidFill>
-                <a:schemeClr val="bg1"/>
-              </a:solidFill>
-              <a:cs typeface="Arial" pitchFamily="34" charset="0"/>
-            </a:endParaRPr>
-          </a:p>
-        </p:txBody>
-      </p:sp>
       <p:graphicFrame>
         <p:nvGraphicFramePr>
           <p:cNvPr id="3" name="Tabla 2"/>
@@ -14151,6 +14064,93 @@
           </a:graphicData>
         </a:graphic>
       </p:graphicFrame>
+      <p:sp>
+        <p:nvSpPr>
+          <p:cNvPr id="11" name="Oval 4"/>
+          <p:cNvSpPr/>
+          <p:nvPr/>
+        </p:nvSpPr>
+        <p:spPr>
+          <a:xfrm>
+            <a:off x="395536" y="1340768"/>
+            <a:ext cx="540000" cy="540000"/>
+          </a:xfrm>
+          <a:prstGeom prst="ellipse">
+            <a:avLst/>
+          </a:prstGeom>
+          <a:solidFill>
+            <a:schemeClr val="accent1"/>
+          </a:solidFill>
+          <a:ln>
+            <a:noFill/>
+          </a:ln>
+        </p:spPr>
+        <p:style>
+          <a:lnRef idx="2">
+            <a:schemeClr val="accent1">
+              <a:shade val="50000"/>
+            </a:schemeClr>
+          </a:lnRef>
+          <a:fillRef idx="1">
+            <a:schemeClr val="accent1"/>
+          </a:fillRef>
+          <a:effectRef idx="0">
+            <a:schemeClr val="accent1"/>
+          </a:effectRef>
+          <a:fontRef idx="minor">
+            <a:schemeClr val="lt1"/>
+          </a:fontRef>
+        </p:style>
+        <p:txBody>
+          <a:bodyPr rtlCol="0" anchor="ctr"/>
+          <a:lstStyle/>
+          <a:p>
+            <a:pPr algn="ctr"/>
+            <a:endParaRPr lang="en-US"/>
+          </a:p>
+        </p:txBody>
+      </p:sp>
+      <p:sp>
+        <p:nvSpPr>
+          <p:cNvPr id="12" name="TextBox 21"/>
+          <p:cNvSpPr txBox="1"/>
+          <p:nvPr/>
+        </p:nvSpPr>
+        <p:spPr>
+          <a:xfrm>
+            <a:off x="395536" y="1379935"/>
+            <a:ext cx="540000" cy="461665"/>
+          </a:xfrm>
+          <a:prstGeom prst="rect">
+            <a:avLst/>
+          </a:prstGeom>
+          <a:noFill/>
+        </p:spPr>
+        <p:txBody>
+          <a:bodyPr wrap="square" rtlCol="0" anchor="ctr">
+            <a:spAutoFit/>
+          </a:bodyPr>
+          <a:lstStyle/>
+          <a:p>
+            <a:pPr algn="ctr"/>
+            <a:r>
+              <a:rPr lang="en-US" altLang="ko-KR" sz="2400" b="1" dirty="0" smtClean="0">
+                <a:solidFill>
+                  <a:schemeClr val="bg1"/>
+                </a:solidFill>
+                <a:cs typeface="Arial" pitchFamily="34" charset="0"/>
+              </a:rPr>
+              <a:t>08</a:t>
+            </a:r>
+            <a:endParaRPr lang="ko-KR" altLang="en-US" sz="2400" b="1" dirty="0">
+              <a:solidFill>
+                <a:schemeClr val="bg1"/>
+              </a:solidFill>
+              <a:cs typeface="Arial" pitchFamily="34" charset="0"/>
+            </a:endParaRPr>
+          </a:p>
+        </p:txBody>
+      </p:sp>
     </p:spTree>
     <p:extLst>
       <p:ext uri="{BB962C8B-B14F-4D97-AF65-F5344CB8AC3E}">
@@ -14890,93 +14890,6 @@
               <a:solidFill>
                 <a:schemeClr val="tx1"/>
               </a:solidFill>
-            </a:endParaRPr>
-          </a:p>
-        </p:txBody>
-      </p:sp>
-      <p:sp>
-        <p:nvSpPr>
-          <p:cNvPr id="16" name="Oval 4"/>
-          <p:cNvSpPr/>
-          <p:nvPr/>
-        </p:nvSpPr>
-        <p:spPr>
-          <a:xfrm>
-            <a:off x="251521" y="1268760"/>
-            <a:ext cx="720080" cy="720080"/>
-          </a:xfrm>
-          <a:prstGeom prst="ellipse">
-            <a:avLst/>
-          </a:prstGeom>
-          <a:solidFill>
-            <a:schemeClr val="accent1"/>
-          </a:solidFill>
-          <a:ln>
-            <a:noFill/>
-          </a:ln>
-        </p:spPr>
-        <p:style>
-          <a:lnRef idx="2">
-            <a:schemeClr val="accent1">
-              <a:shade val="50000"/>
-            </a:schemeClr>
-          </a:lnRef>
-          <a:fillRef idx="1">
-            <a:schemeClr val="accent1"/>
-          </a:fillRef>
-          <a:effectRef idx="0">
-            <a:schemeClr val="accent1"/>
-          </a:effectRef>
-          <a:fontRef idx="minor">
-            <a:schemeClr val="lt1"/>
-          </a:fontRef>
-        </p:style>
-        <p:txBody>
-          <a:bodyPr rtlCol="0" anchor="ctr"/>
-          <a:lstStyle/>
-          <a:p>
-            <a:pPr algn="ctr"/>
-            <a:endParaRPr lang="en-US"/>
-          </a:p>
-        </p:txBody>
-      </p:sp>
-      <p:sp>
-        <p:nvSpPr>
-          <p:cNvPr id="17" name="TextBox 21"/>
-          <p:cNvSpPr txBox="1"/>
-          <p:nvPr/>
-        </p:nvSpPr>
-        <p:spPr>
-          <a:xfrm>
-            <a:off x="251520" y="1397968"/>
-            <a:ext cx="720082" cy="461665"/>
-          </a:xfrm>
-          <a:prstGeom prst="rect">
-            <a:avLst/>
-          </a:prstGeom>
-          <a:noFill/>
-        </p:spPr>
-        <p:txBody>
-          <a:bodyPr wrap="square" rtlCol="0" anchor="ctr">
-            <a:spAutoFit/>
-          </a:bodyPr>
-          <a:lstStyle/>
-          <a:p>
-            <a:pPr algn="ctr"/>
-            <a:r>
-              <a:rPr lang="en-US" altLang="ko-KR" sz="2400" b="1" dirty="0" smtClean="0">
-                <a:solidFill>
-                  <a:schemeClr val="bg1"/>
-                </a:solidFill>
-                <a:cs typeface="Arial" pitchFamily="34" charset="0"/>
-              </a:rPr>
-              <a:t>09</a:t>
-            </a:r>
-            <a:endParaRPr lang="ko-KR" altLang="en-US" sz="2400" b="1" dirty="0">
-              <a:solidFill>
-                <a:schemeClr val="bg1"/>
-              </a:solidFill>
-              <a:cs typeface="Arial" pitchFamily="34" charset="0"/>
             </a:endParaRPr>
           </a:p>
         </p:txBody>
@@ -16180,6 +16093,93 @@
           </a:p>
         </p:txBody>
       </p:sp>
+      <p:sp>
+        <p:nvSpPr>
+          <p:cNvPr id="13" name="Oval 4"/>
+          <p:cNvSpPr/>
+          <p:nvPr/>
+        </p:nvSpPr>
+        <p:spPr>
+          <a:xfrm>
+            <a:off x="395536" y="1340768"/>
+            <a:ext cx="540000" cy="540000"/>
+          </a:xfrm>
+          <a:prstGeom prst="ellipse">
+            <a:avLst/>
+          </a:prstGeom>
+          <a:solidFill>
+            <a:schemeClr val="accent1"/>
+          </a:solidFill>
+          <a:ln>
+            <a:noFill/>
+          </a:ln>
+        </p:spPr>
+        <p:style>
+          <a:lnRef idx="2">
+            <a:schemeClr val="accent1">
+              <a:shade val="50000"/>
+            </a:schemeClr>
+          </a:lnRef>
+          <a:fillRef idx="1">
+            <a:schemeClr val="accent1"/>
+          </a:fillRef>
+          <a:effectRef idx="0">
+            <a:schemeClr val="accent1"/>
+          </a:effectRef>
+          <a:fontRef idx="minor">
+            <a:schemeClr val="lt1"/>
+          </a:fontRef>
+        </p:style>
+        <p:txBody>
+          <a:bodyPr rtlCol="0" anchor="ctr"/>
+          <a:lstStyle/>
+          <a:p>
+            <a:pPr algn="ctr"/>
+            <a:endParaRPr lang="en-US"/>
+          </a:p>
+        </p:txBody>
+      </p:sp>
+      <p:sp>
+        <p:nvSpPr>
+          <p:cNvPr id="14" name="TextBox 21"/>
+          <p:cNvSpPr txBox="1"/>
+          <p:nvPr/>
+        </p:nvSpPr>
+        <p:spPr>
+          <a:xfrm>
+            <a:off x="395536" y="1379935"/>
+            <a:ext cx="540000" cy="461665"/>
+          </a:xfrm>
+          <a:prstGeom prst="rect">
+            <a:avLst/>
+          </a:prstGeom>
+          <a:noFill/>
+        </p:spPr>
+        <p:txBody>
+          <a:bodyPr wrap="square" rtlCol="0" anchor="ctr">
+            <a:spAutoFit/>
+          </a:bodyPr>
+          <a:lstStyle/>
+          <a:p>
+            <a:pPr algn="ctr"/>
+            <a:r>
+              <a:rPr lang="en-US" altLang="ko-KR" sz="2400" b="1" dirty="0" smtClean="0">
+                <a:solidFill>
+                  <a:schemeClr val="bg1"/>
+                </a:solidFill>
+                <a:cs typeface="Arial" pitchFamily="34" charset="0"/>
+              </a:rPr>
+              <a:t>09</a:t>
+            </a:r>
+            <a:endParaRPr lang="ko-KR" altLang="en-US" sz="2400" b="1" dirty="0">
+              <a:solidFill>
+                <a:schemeClr val="bg1"/>
+              </a:solidFill>
+              <a:cs typeface="Arial" pitchFamily="34" charset="0"/>
+            </a:endParaRPr>
+          </a:p>
+        </p:txBody>
+      </p:sp>
     </p:spTree>
     <p:extLst>
       <p:ext uri="{BB962C8B-B14F-4D97-AF65-F5344CB8AC3E}">
@@ -16989,93 +16989,6 @@
               <a:solidFill>
                 <a:schemeClr val="tx1"/>
               </a:solidFill>
-            </a:endParaRPr>
-          </a:p>
-        </p:txBody>
-      </p:sp>
-      <p:sp>
-        <p:nvSpPr>
-          <p:cNvPr id="16" name="Oval 4"/>
-          <p:cNvSpPr/>
-          <p:nvPr/>
-        </p:nvSpPr>
-        <p:spPr>
-          <a:xfrm>
-            <a:off x="251521" y="1268760"/>
-            <a:ext cx="720080" cy="720080"/>
-          </a:xfrm>
-          <a:prstGeom prst="ellipse">
-            <a:avLst/>
-          </a:prstGeom>
-          <a:solidFill>
-            <a:schemeClr val="accent1"/>
-          </a:solidFill>
-          <a:ln>
-            <a:noFill/>
-          </a:ln>
-        </p:spPr>
-        <p:style>
-          <a:lnRef idx="2">
-            <a:schemeClr val="accent1">
-              <a:shade val="50000"/>
-            </a:schemeClr>
-          </a:lnRef>
-          <a:fillRef idx="1">
-            <a:schemeClr val="accent1"/>
-          </a:fillRef>
-          <a:effectRef idx="0">
-            <a:schemeClr val="accent1"/>
-          </a:effectRef>
-          <a:fontRef idx="minor">
-            <a:schemeClr val="lt1"/>
-          </a:fontRef>
-        </p:style>
-        <p:txBody>
-          <a:bodyPr rtlCol="0" anchor="ctr"/>
-          <a:lstStyle/>
-          <a:p>
-            <a:pPr algn="ctr"/>
-            <a:endParaRPr lang="en-US"/>
-          </a:p>
-        </p:txBody>
-      </p:sp>
-      <p:sp>
-        <p:nvSpPr>
-          <p:cNvPr id="17" name="TextBox 21"/>
-          <p:cNvSpPr txBox="1"/>
-          <p:nvPr/>
-        </p:nvSpPr>
-        <p:spPr>
-          <a:xfrm>
-            <a:off x="251520" y="1397968"/>
-            <a:ext cx="720082" cy="461665"/>
-          </a:xfrm>
-          <a:prstGeom prst="rect">
-            <a:avLst/>
-          </a:prstGeom>
-          <a:noFill/>
-        </p:spPr>
-        <p:txBody>
-          <a:bodyPr wrap="square" rtlCol="0" anchor="ctr">
-            <a:spAutoFit/>
-          </a:bodyPr>
-          <a:lstStyle/>
-          <a:p>
-            <a:pPr algn="ctr"/>
-            <a:r>
-              <a:rPr lang="en-US" altLang="ko-KR" sz="2400" b="1" dirty="0" smtClean="0">
-                <a:solidFill>
-                  <a:schemeClr val="bg1"/>
-                </a:solidFill>
-                <a:cs typeface="Arial" pitchFamily="34" charset="0"/>
-              </a:rPr>
-              <a:t>09</a:t>
-            </a:r>
-            <a:endParaRPr lang="ko-KR" altLang="en-US" sz="2400" b="1" dirty="0">
-              <a:solidFill>
-                <a:schemeClr val="bg1"/>
-              </a:solidFill>
-              <a:cs typeface="Arial" pitchFamily="34" charset="0"/>
             </a:endParaRPr>
           </a:p>
         </p:txBody>
@@ -18279,6 +18192,93 @@
           </a:p>
         </p:txBody>
       </p:sp>
+      <p:sp>
+        <p:nvSpPr>
+          <p:cNvPr id="13" name="Oval 4"/>
+          <p:cNvSpPr/>
+          <p:nvPr/>
+        </p:nvSpPr>
+        <p:spPr>
+          <a:xfrm>
+            <a:off x="395536" y="1340768"/>
+            <a:ext cx="540000" cy="540000"/>
+          </a:xfrm>
+          <a:prstGeom prst="ellipse">
+            <a:avLst/>
+          </a:prstGeom>
+          <a:solidFill>
+            <a:schemeClr val="accent1"/>
+          </a:solidFill>
+          <a:ln>
+            <a:noFill/>
+          </a:ln>
+        </p:spPr>
+        <p:style>
+          <a:lnRef idx="2">
+            <a:schemeClr val="accent1">
+              <a:shade val="50000"/>
+            </a:schemeClr>
+          </a:lnRef>
+          <a:fillRef idx="1">
+            <a:schemeClr val="accent1"/>
+          </a:fillRef>
+          <a:effectRef idx="0">
+            <a:schemeClr val="accent1"/>
+          </a:effectRef>
+          <a:fontRef idx="minor">
+            <a:schemeClr val="lt1"/>
+          </a:fontRef>
+        </p:style>
+        <p:txBody>
+          <a:bodyPr rtlCol="0" anchor="ctr"/>
+          <a:lstStyle/>
+          <a:p>
+            <a:pPr algn="ctr"/>
+            <a:endParaRPr lang="en-US"/>
+          </a:p>
+        </p:txBody>
+      </p:sp>
+      <p:sp>
+        <p:nvSpPr>
+          <p:cNvPr id="14" name="TextBox 21"/>
+          <p:cNvSpPr txBox="1"/>
+          <p:nvPr/>
+        </p:nvSpPr>
+        <p:spPr>
+          <a:xfrm>
+            <a:off x="395536" y="1379935"/>
+            <a:ext cx="540000" cy="461665"/>
+          </a:xfrm>
+          <a:prstGeom prst="rect">
+            <a:avLst/>
+          </a:prstGeom>
+          <a:noFill/>
+        </p:spPr>
+        <p:txBody>
+          <a:bodyPr wrap="square" rtlCol="0" anchor="ctr">
+            <a:spAutoFit/>
+          </a:bodyPr>
+          <a:lstStyle/>
+          <a:p>
+            <a:pPr algn="ctr"/>
+            <a:r>
+              <a:rPr lang="en-US" altLang="ko-KR" sz="2400" b="1" dirty="0" smtClean="0">
+                <a:solidFill>
+                  <a:schemeClr val="bg1"/>
+                </a:solidFill>
+                <a:cs typeface="Arial" pitchFamily="34" charset="0"/>
+              </a:rPr>
+              <a:t>09</a:t>
+            </a:r>
+            <a:endParaRPr lang="ko-KR" altLang="en-US" sz="2400" b="1" dirty="0">
+              <a:solidFill>
+                <a:schemeClr val="bg1"/>
+              </a:solidFill>
+              <a:cs typeface="Arial" pitchFamily="34" charset="0"/>
+            </a:endParaRPr>
+          </a:p>
+        </p:txBody>
+      </p:sp>
     </p:spTree>
     <p:extLst>
       <p:ext uri="{BB962C8B-B14F-4D97-AF65-F5344CB8AC3E}">
@@ -18923,93 +18923,6 @@
               </a:rPr>
               <a:t>donde es despacho el crudo o producto hacia la embarcación nominada por el cliente</a:t>
             </a:r>
-          </a:p>
-        </p:txBody>
-      </p:sp>
-      <p:sp>
-        <p:nvSpPr>
-          <p:cNvPr id="16" name="Oval 4"/>
-          <p:cNvSpPr/>
-          <p:nvPr/>
-        </p:nvSpPr>
-        <p:spPr>
-          <a:xfrm>
-            <a:off x="251521" y="1268760"/>
-            <a:ext cx="720080" cy="720080"/>
-          </a:xfrm>
-          <a:prstGeom prst="ellipse">
-            <a:avLst/>
-          </a:prstGeom>
-          <a:solidFill>
-            <a:schemeClr val="accent1"/>
-          </a:solidFill>
-          <a:ln>
-            <a:noFill/>
-          </a:ln>
-        </p:spPr>
-        <p:style>
-          <a:lnRef idx="2">
-            <a:schemeClr val="accent1">
-              <a:shade val="50000"/>
-            </a:schemeClr>
-          </a:lnRef>
-          <a:fillRef idx="1">
-            <a:schemeClr val="accent1"/>
-          </a:fillRef>
-          <a:effectRef idx="0">
-            <a:schemeClr val="accent1"/>
-          </a:effectRef>
-          <a:fontRef idx="minor">
-            <a:schemeClr val="lt1"/>
-          </a:fontRef>
-        </p:style>
-        <p:txBody>
-          <a:bodyPr rtlCol="0" anchor="ctr"/>
-          <a:lstStyle/>
-          <a:p>
-            <a:pPr algn="ctr"/>
-            <a:endParaRPr lang="en-US"/>
-          </a:p>
-        </p:txBody>
-      </p:sp>
-      <p:sp>
-        <p:nvSpPr>
-          <p:cNvPr id="17" name="TextBox 21"/>
-          <p:cNvSpPr txBox="1"/>
-          <p:nvPr/>
-        </p:nvSpPr>
-        <p:spPr>
-          <a:xfrm>
-            <a:off x="251520" y="1397968"/>
-            <a:ext cx="720082" cy="461665"/>
-          </a:xfrm>
-          <a:prstGeom prst="rect">
-            <a:avLst/>
-          </a:prstGeom>
-          <a:noFill/>
-        </p:spPr>
-        <p:txBody>
-          <a:bodyPr wrap="square" rtlCol="0" anchor="ctr">
-            <a:spAutoFit/>
-          </a:bodyPr>
-          <a:lstStyle/>
-          <a:p>
-            <a:pPr algn="ctr"/>
-            <a:r>
-              <a:rPr lang="en-US" altLang="ko-KR" sz="2400" b="1" dirty="0" smtClean="0">
-                <a:solidFill>
-                  <a:schemeClr val="bg1"/>
-                </a:solidFill>
-                <a:cs typeface="Arial" pitchFamily="34" charset="0"/>
-              </a:rPr>
-              <a:t>10</a:t>
-            </a:r>
-            <a:endParaRPr lang="ko-KR" altLang="en-US" sz="2400" b="1" dirty="0">
-              <a:solidFill>
-                <a:schemeClr val="bg1"/>
-              </a:solidFill>
-              <a:cs typeface="Arial" pitchFamily="34" charset="0"/>
-            </a:endParaRPr>
           </a:p>
         </p:txBody>
       </p:sp>
@@ -19682,6 +19595,93 @@
           </a:p>
         </p:txBody>
       </p:sp>
+      <p:sp>
+        <p:nvSpPr>
+          <p:cNvPr id="13" name="Oval 4"/>
+          <p:cNvSpPr/>
+          <p:nvPr/>
+        </p:nvSpPr>
+        <p:spPr>
+          <a:xfrm>
+            <a:off x="395536" y="1340768"/>
+            <a:ext cx="540000" cy="540000"/>
+          </a:xfrm>
+          <a:prstGeom prst="ellipse">
+            <a:avLst/>
+          </a:prstGeom>
+          <a:solidFill>
+            <a:schemeClr val="accent1"/>
+          </a:solidFill>
+          <a:ln>
+            <a:noFill/>
+          </a:ln>
+        </p:spPr>
+        <p:style>
+          <a:lnRef idx="2">
+            <a:schemeClr val="accent1">
+              <a:shade val="50000"/>
+            </a:schemeClr>
+          </a:lnRef>
+          <a:fillRef idx="1">
+            <a:schemeClr val="accent1"/>
+          </a:fillRef>
+          <a:effectRef idx="0">
+            <a:schemeClr val="accent1"/>
+          </a:effectRef>
+          <a:fontRef idx="minor">
+            <a:schemeClr val="lt1"/>
+          </a:fontRef>
+        </p:style>
+        <p:txBody>
+          <a:bodyPr rtlCol="0" anchor="ctr"/>
+          <a:lstStyle/>
+          <a:p>
+            <a:pPr algn="ctr"/>
+            <a:endParaRPr lang="en-US"/>
+          </a:p>
+        </p:txBody>
+      </p:sp>
+      <p:sp>
+        <p:nvSpPr>
+          <p:cNvPr id="14" name="TextBox 21"/>
+          <p:cNvSpPr txBox="1"/>
+          <p:nvPr/>
+        </p:nvSpPr>
+        <p:spPr>
+          <a:xfrm>
+            <a:off x="386392" y="1379935"/>
+            <a:ext cx="540000" cy="461665"/>
+          </a:xfrm>
+          <a:prstGeom prst="rect">
+            <a:avLst/>
+          </a:prstGeom>
+          <a:noFill/>
+        </p:spPr>
+        <p:txBody>
+          <a:bodyPr wrap="square" rtlCol="0" anchor="ctr">
+            <a:spAutoFit/>
+          </a:bodyPr>
+          <a:lstStyle/>
+          <a:p>
+            <a:pPr algn="ctr"/>
+            <a:r>
+              <a:rPr lang="en-US" altLang="ko-KR" sz="2400" b="1" dirty="0" smtClean="0">
+                <a:solidFill>
+                  <a:schemeClr val="bg1"/>
+                </a:solidFill>
+                <a:cs typeface="Arial" pitchFamily="34" charset="0"/>
+              </a:rPr>
+              <a:t>10</a:t>
+            </a:r>
+            <a:endParaRPr lang="ko-KR" altLang="en-US" sz="2400" b="1" dirty="0">
+              <a:solidFill>
+                <a:schemeClr val="bg1"/>
+              </a:solidFill>
+              <a:cs typeface="Arial" pitchFamily="34" charset="0"/>
+            </a:endParaRPr>
+          </a:p>
+        </p:txBody>
+      </p:sp>
     </p:spTree>
     <p:extLst>
       <p:ext uri="{BB962C8B-B14F-4D97-AF65-F5344CB8AC3E}">
@@ -20469,93 +20469,6 @@
               </a:rPr>
               <a:t>del crudo o producto.</a:t>
             </a:r>
-          </a:p>
-        </p:txBody>
-      </p:sp>
-      <p:sp>
-        <p:nvSpPr>
-          <p:cNvPr id="16" name="Oval 4"/>
-          <p:cNvSpPr/>
-          <p:nvPr/>
-        </p:nvSpPr>
-        <p:spPr>
-          <a:xfrm>
-            <a:off x="251521" y="1268760"/>
-            <a:ext cx="720080" cy="720080"/>
-          </a:xfrm>
-          <a:prstGeom prst="ellipse">
-            <a:avLst/>
-          </a:prstGeom>
-          <a:solidFill>
-            <a:schemeClr val="accent1"/>
-          </a:solidFill>
-          <a:ln>
-            <a:noFill/>
-          </a:ln>
-        </p:spPr>
-        <p:style>
-          <a:lnRef idx="2">
-            <a:schemeClr val="accent1">
-              <a:shade val="50000"/>
-            </a:schemeClr>
-          </a:lnRef>
-          <a:fillRef idx="1">
-            <a:schemeClr val="accent1"/>
-          </a:fillRef>
-          <a:effectRef idx="0">
-            <a:schemeClr val="accent1"/>
-          </a:effectRef>
-          <a:fontRef idx="minor">
-            <a:schemeClr val="lt1"/>
-          </a:fontRef>
-        </p:style>
-        <p:txBody>
-          <a:bodyPr rtlCol="0" anchor="ctr"/>
-          <a:lstStyle/>
-          <a:p>
-            <a:pPr algn="ctr"/>
-            <a:endParaRPr lang="en-US"/>
-          </a:p>
-        </p:txBody>
-      </p:sp>
-      <p:sp>
-        <p:nvSpPr>
-          <p:cNvPr id="17" name="TextBox 21"/>
-          <p:cNvSpPr txBox="1"/>
-          <p:nvPr/>
-        </p:nvSpPr>
-        <p:spPr>
-          <a:xfrm>
-            <a:off x="251520" y="1397968"/>
-            <a:ext cx="720082" cy="461665"/>
-          </a:xfrm>
-          <a:prstGeom prst="rect">
-            <a:avLst/>
-          </a:prstGeom>
-          <a:noFill/>
-        </p:spPr>
-        <p:txBody>
-          <a:bodyPr wrap="square" rtlCol="0" anchor="ctr">
-            <a:spAutoFit/>
-          </a:bodyPr>
-          <a:lstStyle/>
-          <a:p>
-            <a:pPr algn="ctr"/>
-            <a:r>
-              <a:rPr lang="en-US" altLang="ko-KR" sz="2400" b="1" dirty="0" smtClean="0">
-                <a:solidFill>
-                  <a:schemeClr val="bg1"/>
-                </a:solidFill>
-                <a:cs typeface="Arial" pitchFamily="34" charset="0"/>
-              </a:rPr>
-              <a:t>11</a:t>
-            </a:r>
-            <a:endParaRPr lang="ko-KR" altLang="en-US" sz="2400" b="1" dirty="0">
-              <a:solidFill>
-                <a:schemeClr val="bg1"/>
-              </a:solidFill>
-              <a:cs typeface="Arial" pitchFamily="34" charset="0"/>
-            </a:endParaRPr>
           </a:p>
         </p:txBody>
       </p:sp>
@@ -21760,6 +21673,93 @@
             </a:r>
             <a:endParaRPr lang="en-US" sz="2400" b="1" dirty="0">
               <a:latin typeface="Tahoma" charset="0"/>
+            </a:endParaRPr>
+          </a:p>
+        </p:txBody>
+      </p:sp>
+      <p:sp>
+        <p:nvSpPr>
+          <p:cNvPr id="13" name="Oval 4"/>
+          <p:cNvSpPr/>
+          <p:nvPr/>
+        </p:nvSpPr>
+        <p:spPr>
+          <a:xfrm>
+            <a:off x="395536" y="1340768"/>
+            <a:ext cx="540000" cy="540000"/>
+          </a:xfrm>
+          <a:prstGeom prst="ellipse">
+            <a:avLst/>
+          </a:prstGeom>
+          <a:solidFill>
+            <a:schemeClr val="accent1"/>
+          </a:solidFill>
+          <a:ln>
+            <a:noFill/>
+          </a:ln>
+        </p:spPr>
+        <p:style>
+          <a:lnRef idx="2">
+            <a:schemeClr val="accent1">
+              <a:shade val="50000"/>
+            </a:schemeClr>
+          </a:lnRef>
+          <a:fillRef idx="1">
+            <a:schemeClr val="accent1"/>
+          </a:fillRef>
+          <a:effectRef idx="0">
+            <a:schemeClr val="accent1"/>
+          </a:effectRef>
+          <a:fontRef idx="minor">
+            <a:schemeClr val="lt1"/>
+          </a:fontRef>
+        </p:style>
+        <p:txBody>
+          <a:bodyPr rtlCol="0" anchor="ctr"/>
+          <a:lstStyle/>
+          <a:p>
+            <a:pPr algn="ctr"/>
+            <a:endParaRPr lang="en-US"/>
+          </a:p>
+        </p:txBody>
+      </p:sp>
+      <p:sp>
+        <p:nvSpPr>
+          <p:cNvPr id="14" name="TextBox 21"/>
+          <p:cNvSpPr txBox="1"/>
+          <p:nvPr/>
+        </p:nvSpPr>
+        <p:spPr>
+          <a:xfrm>
+            <a:off x="386392" y="1379935"/>
+            <a:ext cx="540000" cy="461665"/>
+          </a:xfrm>
+          <a:prstGeom prst="rect">
+            <a:avLst/>
+          </a:prstGeom>
+          <a:noFill/>
+        </p:spPr>
+        <p:txBody>
+          <a:bodyPr wrap="square" rtlCol="0" anchor="ctr">
+            <a:spAutoFit/>
+          </a:bodyPr>
+          <a:lstStyle/>
+          <a:p>
+            <a:pPr algn="ctr"/>
+            <a:r>
+              <a:rPr lang="en-US" altLang="ko-KR" sz="2400" b="1" dirty="0" smtClean="0">
+                <a:solidFill>
+                  <a:schemeClr val="bg1"/>
+                </a:solidFill>
+                <a:cs typeface="Arial" pitchFamily="34" charset="0"/>
+              </a:rPr>
+              <a:t>11</a:t>
+            </a:r>
+            <a:endParaRPr lang="ko-KR" altLang="en-US" sz="2400" b="1" dirty="0">
+              <a:solidFill>
+                <a:schemeClr val="bg1"/>
+              </a:solidFill>
+              <a:cs typeface="Arial" pitchFamily="34" charset="0"/>
             </a:endParaRPr>
           </a:p>
         </p:txBody>
@@ -23780,93 +23780,6 @@
           </a:p>
         </p:txBody>
       </p:sp>
-      <p:sp>
-        <p:nvSpPr>
-          <p:cNvPr id="16" name="Oval 4"/>
-          <p:cNvSpPr/>
-          <p:nvPr/>
-        </p:nvSpPr>
-        <p:spPr>
-          <a:xfrm>
-            <a:off x="251521" y="1268760"/>
-            <a:ext cx="720080" cy="720080"/>
-          </a:xfrm>
-          <a:prstGeom prst="ellipse">
-            <a:avLst/>
-          </a:prstGeom>
-          <a:solidFill>
-            <a:schemeClr val="accent1"/>
-          </a:solidFill>
-          <a:ln>
-            <a:noFill/>
-          </a:ln>
-        </p:spPr>
-        <p:style>
-          <a:lnRef idx="2">
-            <a:schemeClr val="accent1">
-              <a:shade val="50000"/>
-            </a:schemeClr>
-          </a:lnRef>
-          <a:fillRef idx="1">
-            <a:schemeClr val="accent1"/>
-          </a:fillRef>
-          <a:effectRef idx="0">
-            <a:schemeClr val="accent1"/>
-          </a:effectRef>
-          <a:fontRef idx="minor">
-            <a:schemeClr val="lt1"/>
-          </a:fontRef>
-        </p:style>
-        <p:txBody>
-          <a:bodyPr rtlCol="0" anchor="ctr"/>
-          <a:lstStyle/>
-          <a:p>
-            <a:pPr algn="ctr"/>
-            <a:endParaRPr lang="en-US"/>
-          </a:p>
-        </p:txBody>
-      </p:sp>
-      <p:sp>
-        <p:nvSpPr>
-          <p:cNvPr id="17" name="TextBox 21"/>
-          <p:cNvSpPr txBox="1"/>
-          <p:nvPr/>
-        </p:nvSpPr>
-        <p:spPr>
-          <a:xfrm>
-            <a:off x="251520" y="1397968"/>
-            <a:ext cx="720082" cy="461665"/>
-          </a:xfrm>
-          <a:prstGeom prst="rect">
-            <a:avLst/>
-          </a:prstGeom>
-          <a:noFill/>
-        </p:spPr>
-        <p:txBody>
-          <a:bodyPr wrap="square" rtlCol="0" anchor="ctr">
-            <a:spAutoFit/>
-          </a:bodyPr>
-          <a:lstStyle/>
-          <a:p>
-            <a:pPr algn="ctr"/>
-            <a:r>
-              <a:rPr lang="en-US" altLang="ko-KR" sz="2400" b="1" dirty="0" smtClean="0">
-                <a:solidFill>
-                  <a:schemeClr val="bg1"/>
-                </a:solidFill>
-                <a:cs typeface="Arial" pitchFamily="34" charset="0"/>
-              </a:rPr>
-              <a:t>11</a:t>
-            </a:r>
-            <a:endParaRPr lang="ko-KR" altLang="en-US" sz="2400" b="1" dirty="0">
-              <a:solidFill>
-                <a:schemeClr val="bg1"/>
-              </a:solidFill>
-              <a:cs typeface="Arial" pitchFamily="34" charset="0"/>
-            </a:endParaRPr>
-          </a:p>
-        </p:txBody>
-      </p:sp>
       <p:graphicFrame>
         <p:nvGraphicFramePr>
           <p:cNvPr id="4" name="Tabla 3"/>
@@ -25072,6 +24985,93 @@
           </a:p>
         </p:txBody>
       </p:sp>
+      <p:sp>
+        <p:nvSpPr>
+          <p:cNvPr id="13" name="Oval 4"/>
+          <p:cNvSpPr/>
+          <p:nvPr/>
+        </p:nvSpPr>
+        <p:spPr>
+          <a:xfrm>
+            <a:off x="395536" y="1340768"/>
+            <a:ext cx="540000" cy="540000"/>
+          </a:xfrm>
+          <a:prstGeom prst="ellipse">
+            <a:avLst/>
+          </a:prstGeom>
+          <a:solidFill>
+            <a:schemeClr val="accent1"/>
+          </a:solidFill>
+          <a:ln>
+            <a:noFill/>
+          </a:ln>
+        </p:spPr>
+        <p:style>
+          <a:lnRef idx="2">
+            <a:schemeClr val="accent1">
+              <a:shade val="50000"/>
+            </a:schemeClr>
+          </a:lnRef>
+          <a:fillRef idx="1">
+            <a:schemeClr val="accent1"/>
+          </a:fillRef>
+          <a:effectRef idx="0">
+            <a:schemeClr val="accent1"/>
+          </a:effectRef>
+          <a:fontRef idx="minor">
+            <a:schemeClr val="lt1"/>
+          </a:fontRef>
+        </p:style>
+        <p:txBody>
+          <a:bodyPr rtlCol="0" anchor="ctr"/>
+          <a:lstStyle/>
+          <a:p>
+            <a:pPr algn="ctr"/>
+            <a:endParaRPr lang="en-US"/>
+          </a:p>
+        </p:txBody>
+      </p:sp>
+      <p:sp>
+        <p:nvSpPr>
+          <p:cNvPr id="14" name="TextBox 21"/>
+          <p:cNvSpPr txBox="1"/>
+          <p:nvPr/>
+        </p:nvSpPr>
+        <p:spPr>
+          <a:xfrm>
+            <a:off x="386392" y="1379935"/>
+            <a:ext cx="540000" cy="461665"/>
+          </a:xfrm>
+          <a:prstGeom prst="rect">
+            <a:avLst/>
+          </a:prstGeom>
+          <a:noFill/>
+        </p:spPr>
+        <p:txBody>
+          <a:bodyPr wrap="square" rtlCol="0" anchor="ctr">
+            <a:spAutoFit/>
+          </a:bodyPr>
+          <a:lstStyle/>
+          <a:p>
+            <a:pPr algn="ctr"/>
+            <a:r>
+              <a:rPr lang="en-US" altLang="ko-KR" sz="2400" b="1" dirty="0" smtClean="0">
+                <a:solidFill>
+                  <a:schemeClr val="bg1"/>
+                </a:solidFill>
+                <a:cs typeface="Arial" pitchFamily="34" charset="0"/>
+              </a:rPr>
+              <a:t>11</a:t>
+            </a:r>
+            <a:endParaRPr lang="ko-KR" altLang="en-US" sz="2400" b="1" dirty="0">
+              <a:solidFill>
+                <a:schemeClr val="bg1"/>
+              </a:solidFill>
+              <a:cs typeface="Arial" pitchFamily="34" charset="0"/>
+            </a:endParaRPr>
+          </a:p>
+        </p:txBody>
+      </p:sp>
     </p:spTree>
     <p:extLst>
       <p:ext uri="{BB962C8B-B14F-4D97-AF65-F5344CB8AC3E}">
@@ -25876,93 +25876,6 @@
               <a:solidFill>
                 <a:schemeClr val="tx1"/>
               </a:solidFill>
-            </a:endParaRPr>
-          </a:p>
-        </p:txBody>
-      </p:sp>
-      <p:sp>
-        <p:nvSpPr>
-          <p:cNvPr id="16" name="Oval 4"/>
-          <p:cNvSpPr/>
-          <p:nvPr/>
-        </p:nvSpPr>
-        <p:spPr>
-          <a:xfrm>
-            <a:off x="251521" y="1268760"/>
-            <a:ext cx="720080" cy="720080"/>
-          </a:xfrm>
-          <a:prstGeom prst="ellipse">
-            <a:avLst/>
-          </a:prstGeom>
-          <a:solidFill>
-            <a:schemeClr val="accent1"/>
-          </a:solidFill>
-          <a:ln>
-            <a:noFill/>
-          </a:ln>
-        </p:spPr>
-        <p:style>
-          <a:lnRef idx="2">
-            <a:schemeClr val="accent1">
-              <a:shade val="50000"/>
-            </a:schemeClr>
-          </a:lnRef>
-          <a:fillRef idx="1">
-            <a:schemeClr val="accent1"/>
-          </a:fillRef>
-          <a:effectRef idx="0">
-            <a:schemeClr val="accent1"/>
-          </a:effectRef>
-          <a:fontRef idx="minor">
-            <a:schemeClr val="lt1"/>
-          </a:fontRef>
-        </p:style>
-        <p:txBody>
-          <a:bodyPr rtlCol="0" anchor="ctr"/>
-          <a:lstStyle/>
-          <a:p>
-            <a:pPr algn="ctr"/>
-            <a:endParaRPr lang="en-US"/>
-          </a:p>
-        </p:txBody>
-      </p:sp>
-      <p:sp>
-        <p:nvSpPr>
-          <p:cNvPr id="17" name="TextBox 21"/>
-          <p:cNvSpPr txBox="1"/>
-          <p:nvPr/>
-        </p:nvSpPr>
-        <p:spPr>
-          <a:xfrm>
-            <a:off x="251520" y="1397968"/>
-            <a:ext cx="720082" cy="461665"/>
-          </a:xfrm>
-          <a:prstGeom prst="rect">
-            <a:avLst/>
-          </a:prstGeom>
-          <a:noFill/>
-        </p:spPr>
-        <p:txBody>
-          <a:bodyPr wrap="square" rtlCol="0" anchor="ctr">
-            <a:spAutoFit/>
-          </a:bodyPr>
-          <a:lstStyle/>
-          <a:p>
-            <a:pPr algn="ctr"/>
-            <a:r>
-              <a:rPr lang="en-US" altLang="ko-KR" sz="2400" b="1" dirty="0" smtClean="0">
-                <a:solidFill>
-                  <a:schemeClr val="bg1"/>
-                </a:solidFill>
-                <a:cs typeface="Arial" pitchFamily="34" charset="0"/>
-              </a:rPr>
-              <a:t>12</a:t>
-            </a:r>
-            <a:endParaRPr lang="ko-KR" altLang="en-US" sz="2400" b="1" dirty="0">
-              <a:solidFill>
-                <a:schemeClr val="bg1"/>
-              </a:solidFill>
-              <a:cs typeface="Arial" pitchFamily="34" charset="0"/>
             </a:endParaRPr>
           </a:p>
         </p:txBody>
@@ -27319,6 +27232,93 @@
           </a:p>
         </p:txBody>
       </p:sp>
+      <p:sp>
+        <p:nvSpPr>
+          <p:cNvPr id="13" name="Oval 4"/>
+          <p:cNvSpPr/>
+          <p:nvPr/>
+        </p:nvSpPr>
+        <p:spPr>
+          <a:xfrm>
+            <a:off x="395536" y="1340768"/>
+            <a:ext cx="540000" cy="540000"/>
+          </a:xfrm>
+          <a:prstGeom prst="ellipse">
+            <a:avLst/>
+          </a:prstGeom>
+          <a:solidFill>
+            <a:schemeClr val="accent1"/>
+          </a:solidFill>
+          <a:ln>
+            <a:noFill/>
+          </a:ln>
+        </p:spPr>
+        <p:style>
+          <a:lnRef idx="2">
+            <a:schemeClr val="accent1">
+              <a:shade val="50000"/>
+            </a:schemeClr>
+          </a:lnRef>
+          <a:fillRef idx="1">
+            <a:schemeClr val="accent1"/>
+          </a:fillRef>
+          <a:effectRef idx="0">
+            <a:schemeClr val="accent1"/>
+          </a:effectRef>
+          <a:fontRef idx="minor">
+            <a:schemeClr val="lt1"/>
+          </a:fontRef>
+        </p:style>
+        <p:txBody>
+          <a:bodyPr rtlCol="0" anchor="ctr"/>
+          <a:lstStyle/>
+          <a:p>
+            <a:pPr algn="ctr"/>
+            <a:endParaRPr lang="en-US"/>
+          </a:p>
+        </p:txBody>
+      </p:sp>
+      <p:sp>
+        <p:nvSpPr>
+          <p:cNvPr id="14" name="TextBox 21"/>
+          <p:cNvSpPr txBox="1"/>
+          <p:nvPr/>
+        </p:nvSpPr>
+        <p:spPr>
+          <a:xfrm>
+            <a:off x="386392" y="1379935"/>
+            <a:ext cx="540000" cy="461665"/>
+          </a:xfrm>
+          <a:prstGeom prst="rect">
+            <a:avLst/>
+          </a:prstGeom>
+          <a:noFill/>
+        </p:spPr>
+        <p:txBody>
+          <a:bodyPr wrap="square" rtlCol="0" anchor="ctr">
+            <a:spAutoFit/>
+          </a:bodyPr>
+          <a:lstStyle/>
+          <a:p>
+            <a:pPr algn="ctr"/>
+            <a:r>
+              <a:rPr lang="en-US" altLang="ko-KR" sz="2400" b="1" dirty="0" smtClean="0">
+                <a:solidFill>
+                  <a:schemeClr val="bg1"/>
+                </a:solidFill>
+                <a:cs typeface="Arial" pitchFamily="34" charset="0"/>
+              </a:rPr>
+              <a:t>12</a:t>
+            </a:r>
+            <a:endParaRPr lang="ko-KR" altLang="en-US" sz="2400" b="1" dirty="0">
+              <a:solidFill>
+                <a:schemeClr val="bg1"/>
+              </a:solidFill>
+              <a:cs typeface="Arial" pitchFamily="34" charset="0"/>
+            </a:endParaRPr>
+          </a:p>
+        </p:txBody>
+      </p:sp>
     </p:spTree>
     <p:extLst>
       <p:ext uri="{BB962C8B-B14F-4D97-AF65-F5344CB8AC3E}">
@@ -27638,93 +27638,6 @@
               <a:solidFill>
                 <a:schemeClr val="tx1"/>
               </a:solidFill>
-            </a:endParaRPr>
-          </a:p>
-        </p:txBody>
-      </p:sp>
-      <p:sp>
-        <p:nvSpPr>
-          <p:cNvPr id="16" name="Oval 4"/>
-          <p:cNvSpPr/>
-          <p:nvPr/>
-        </p:nvSpPr>
-        <p:spPr>
-          <a:xfrm>
-            <a:off x="251521" y="1268760"/>
-            <a:ext cx="720080" cy="720080"/>
-          </a:xfrm>
-          <a:prstGeom prst="ellipse">
-            <a:avLst/>
-          </a:prstGeom>
-          <a:solidFill>
-            <a:schemeClr val="accent1"/>
-          </a:solidFill>
-          <a:ln>
-            <a:noFill/>
-          </a:ln>
-        </p:spPr>
-        <p:style>
-          <a:lnRef idx="2">
-            <a:schemeClr val="accent1">
-              <a:shade val="50000"/>
-            </a:schemeClr>
-          </a:lnRef>
-          <a:fillRef idx="1">
-            <a:schemeClr val="accent1"/>
-          </a:fillRef>
-          <a:effectRef idx="0">
-            <a:schemeClr val="accent1"/>
-          </a:effectRef>
-          <a:fontRef idx="minor">
-            <a:schemeClr val="lt1"/>
-          </a:fontRef>
-        </p:style>
-        <p:txBody>
-          <a:bodyPr rtlCol="0" anchor="ctr"/>
-          <a:lstStyle/>
-          <a:p>
-            <a:pPr algn="ctr"/>
-            <a:endParaRPr lang="en-US"/>
-          </a:p>
-        </p:txBody>
-      </p:sp>
-      <p:sp>
-        <p:nvSpPr>
-          <p:cNvPr id="17" name="TextBox 21"/>
-          <p:cNvSpPr txBox="1"/>
-          <p:nvPr/>
-        </p:nvSpPr>
-        <p:spPr>
-          <a:xfrm>
-            <a:off x="251520" y="1397968"/>
-            <a:ext cx="720082" cy="461665"/>
-          </a:xfrm>
-          <a:prstGeom prst="rect">
-            <a:avLst/>
-          </a:prstGeom>
-          <a:noFill/>
-        </p:spPr>
-        <p:txBody>
-          <a:bodyPr wrap="square" rtlCol="0" anchor="ctr">
-            <a:spAutoFit/>
-          </a:bodyPr>
-          <a:lstStyle/>
-          <a:p>
-            <a:pPr algn="ctr"/>
-            <a:r>
-              <a:rPr lang="en-US" altLang="ko-KR" sz="2400" b="1" dirty="0" smtClean="0">
-                <a:solidFill>
-                  <a:schemeClr val="bg1"/>
-                </a:solidFill>
-                <a:cs typeface="Arial" pitchFamily="34" charset="0"/>
-              </a:rPr>
-              <a:t>12</a:t>
-            </a:r>
-            <a:endParaRPr lang="ko-KR" altLang="en-US" sz="2400" b="1" dirty="0">
-              <a:solidFill>
-                <a:schemeClr val="bg1"/>
-              </a:solidFill>
-              <a:cs typeface="Arial" pitchFamily="34" charset="0"/>
             </a:endParaRPr>
           </a:p>
         </p:txBody>
@@ -29491,6 +29404,93 @@
             </a:r>
             <a:endParaRPr lang="en-US" sz="2400" b="1" dirty="0">
               <a:latin typeface="Tahoma" charset="0"/>
+            </a:endParaRPr>
+          </a:p>
+        </p:txBody>
+      </p:sp>
+      <p:sp>
+        <p:nvSpPr>
+          <p:cNvPr id="14" name="Oval 4"/>
+          <p:cNvSpPr/>
+          <p:nvPr/>
+        </p:nvSpPr>
+        <p:spPr>
+          <a:xfrm>
+            <a:off x="395536" y="1340768"/>
+            <a:ext cx="540000" cy="540000"/>
+          </a:xfrm>
+          <a:prstGeom prst="ellipse">
+            <a:avLst/>
+          </a:prstGeom>
+          <a:solidFill>
+            <a:schemeClr val="accent1"/>
+          </a:solidFill>
+          <a:ln>
+            <a:noFill/>
+          </a:ln>
+        </p:spPr>
+        <p:style>
+          <a:lnRef idx="2">
+            <a:schemeClr val="accent1">
+              <a:shade val="50000"/>
+            </a:schemeClr>
+          </a:lnRef>
+          <a:fillRef idx="1">
+            <a:schemeClr val="accent1"/>
+          </a:fillRef>
+          <a:effectRef idx="0">
+            <a:schemeClr val="accent1"/>
+          </a:effectRef>
+          <a:fontRef idx="minor">
+            <a:schemeClr val="lt1"/>
+          </a:fontRef>
+        </p:style>
+        <p:txBody>
+          <a:bodyPr rtlCol="0" anchor="ctr"/>
+          <a:lstStyle/>
+          <a:p>
+            <a:pPr algn="ctr"/>
+            <a:endParaRPr lang="en-US"/>
+          </a:p>
+        </p:txBody>
+      </p:sp>
+      <p:sp>
+        <p:nvSpPr>
+          <p:cNvPr id="15" name="TextBox 21"/>
+          <p:cNvSpPr txBox="1"/>
+          <p:nvPr/>
+        </p:nvSpPr>
+        <p:spPr>
+          <a:xfrm>
+            <a:off x="386392" y="1379935"/>
+            <a:ext cx="540000" cy="461665"/>
+          </a:xfrm>
+          <a:prstGeom prst="rect">
+            <a:avLst/>
+          </a:prstGeom>
+          <a:noFill/>
+        </p:spPr>
+        <p:txBody>
+          <a:bodyPr wrap="square" rtlCol="0" anchor="ctr">
+            <a:spAutoFit/>
+          </a:bodyPr>
+          <a:lstStyle/>
+          <a:p>
+            <a:pPr algn="ctr"/>
+            <a:r>
+              <a:rPr lang="en-US" altLang="ko-KR" sz="2400" b="1" dirty="0" smtClean="0">
+                <a:solidFill>
+                  <a:schemeClr val="bg1"/>
+                </a:solidFill>
+                <a:cs typeface="Arial" pitchFamily="34" charset="0"/>
+              </a:rPr>
+              <a:t>12</a:t>
+            </a:r>
+            <a:endParaRPr lang="ko-KR" altLang="en-US" sz="2400" b="1" dirty="0">
+              <a:solidFill>
+                <a:schemeClr val="bg1"/>
+              </a:solidFill>
+              <a:cs typeface="Arial" pitchFamily="34" charset="0"/>
             </a:endParaRPr>
           </a:p>
         </p:txBody>
@@ -30069,15 +30069,7 @@
                   <a:schemeClr val="tx1"/>
                 </a:solidFill>
               </a:rPr>
-              <a:t>’</a:t>
-            </a:r>
-            <a:r>
-              <a:rPr lang="es-MX" sz="1400" dirty="0" smtClean="0">
-                <a:solidFill>
-                  <a:schemeClr val="tx1"/>
-                </a:solidFill>
-              </a:rPr>
-              <a:t>, esta vista muestra la cantidad de embarques, volúmenes y productos despachados con el fin de llevar un seguimiento al cumplimiento de la cuota volumétrica mensual fijada para este cliente.</a:t>
+              <a:t>’, esta vista muestra la cantidad de embarques, volúmenes y productos despachados con el fin de llevar un seguimiento al cumplimiento de la cuota volumétrica mensual fijada para este cliente.</a:t>
             </a:r>
             <a:endParaRPr lang="en-US" sz="1400" dirty="0">
               <a:solidFill>
@@ -33878,15 +33870,7 @@
                   <a:schemeClr val="tx1"/>
                 </a:solidFill>
               </a:rPr>
-              <a:t>registro, </a:t>
-            </a:r>
-            <a:r>
-              <a:rPr lang="es-419" sz="1400" dirty="0" smtClean="0">
-                <a:solidFill>
-                  <a:schemeClr val="tx1"/>
-                </a:solidFill>
-              </a:rPr>
-              <a:t>en caso de  NO existir emite el siguiente mensaje </a:t>
+              <a:t>registro, en caso de  NO existir emite el siguiente mensaje </a:t>
             </a:r>
             <a:r>
               <a:rPr lang="es-MX" sz="1400" b="1" dirty="0" smtClean="0">
@@ -33894,15 +33878,7 @@
                   <a:schemeClr val="tx1"/>
                 </a:solidFill>
               </a:rPr>
-              <a:t>‘</a:t>
-            </a:r>
-            <a:r>
-              <a:rPr lang="es-MX" sz="1400" b="1" dirty="0" smtClean="0">
-                <a:solidFill>
-                  <a:schemeClr val="tx1"/>
-                </a:solidFill>
-              </a:rPr>
-              <a:t>IMO </a:t>
+              <a:t>‘IMO </a:t>
             </a:r>
             <a:r>
               <a:rPr lang="es-MX" sz="1400" b="1" dirty="0">
@@ -36559,93 +36535,6 @@
           </a:p>
         </p:txBody>
       </p:sp>
-      <p:sp>
-        <p:nvSpPr>
-          <p:cNvPr id="28" name="Oval 4"/>
-          <p:cNvSpPr/>
-          <p:nvPr/>
-        </p:nvSpPr>
-        <p:spPr>
-          <a:xfrm>
-            <a:off x="539552" y="1346285"/>
-            <a:ext cx="720080" cy="720080"/>
-          </a:xfrm>
-          <a:prstGeom prst="ellipse">
-            <a:avLst/>
-          </a:prstGeom>
-          <a:solidFill>
-            <a:schemeClr val="accent1"/>
-          </a:solidFill>
-          <a:ln>
-            <a:noFill/>
-          </a:ln>
-        </p:spPr>
-        <p:style>
-          <a:lnRef idx="2">
-            <a:schemeClr val="accent1">
-              <a:shade val="50000"/>
-            </a:schemeClr>
-          </a:lnRef>
-          <a:fillRef idx="1">
-            <a:schemeClr val="accent1"/>
-          </a:fillRef>
-          <a:effectRef idx="0">
-            <a:schemeClr val="accent1"/>
-          </a:effectRef>
-          <a:fontRef idx="minor">
-            <a:schemeClr val="lt1"/>
-          </a:fontRef>
-        </p:style>
-        <p:txBody>
-          <a:bodyPr rtlCol="0" anchor="ctr"/>
-          <a:lstStyle/>
-          <a:p>
-            <a:pPr algn="ctr"/>
-            <a:endParaRPr lang="en-US"/>
-          </a:p>
-        </p:txBody>
-      </p:sp>
-      <p:sp>
-        <p:nvSpPr>
-          <p:cNvPr id="44" name="TextBox 21"/>
-          <p:cNvSpPr txBox="1"/>
-          <p:nvPr/>
-        </p:nvSpPr>
-        <p:spPr>
-          <a:xfrm>
-            <a:off x="539551" y="1475493"/>
-            <a:ext cx="720082" cy="461665"/>
-          </a:xfrm>
-          <a:prstGeom prst="rect">
-            <a:avLst/>
-          </a:prstGeom>
-          <a:noFill/>
-        </p:spPr>
-        <p:txBody>
-          <a:bodyPr wrap="square" rtlCol="0" anchor="ctr">
-            <a:spAutoFit/>
-          </a:bodyPr>
-          <a:lstStyle/>
-          <a:p>
-            <a:pPr algn="ctr"/>
-            <a:r>
-              <a:rPr lang="en-US" altLang="ko-KR" sz="2400" b="1" dirty="0">
-                <a:solidFill>
-                  <a:schemeClr val="bg1"/>
-                </a:solidFill>
-                <a:cs typeface="Arial" pitchFamily="34" charset="0"/>
-              </a:rPr>
-              <a:t>01</a:t>
-            </a:r>
-            <a:endParaRPr lang="ko-KR" altLang="en-US" sz="2400" b="1" dirty="0">
-              <a:solidFill>
-                <a:schemeClr val="bg1"/>
-              </a:solidFill>
-              <a:cs typeface="Arial" pitchFamily="34" charset="0"/>
-            </a:endParaRPr>
-          </a:p>
-        </p:txBody>
-      </p:sp>
       <p:pic>
         <p:nvPicPr>
           <p:cNvPr id="57" name="Imagen 56"/>
@@ -36676,93 +36565,6 @@
           </a:prstGeom>
         </p:spPr>
       </p:pic>
-      <p:sp>
-        <p:nvSpPr>
-          <p:cNvPr id="61" name="Oval 4"/>
-          <p:cNvSpPr/>
-          <p:nvPr/>
-        </p:nvSpPr>
-        <p:spPr>
-          <a:xfrm>
-            <a:off x="539552" y="1340768"/>
-            <a:ext cx="720080" cy="720080"/>
-          </a:xfrm>
-          <a:prstGeom prst="ellipse">
-            <a:avLst/>
-          </a:prstGeom>
-          <a:solidFill>
-            <a:schemeClr val="accent1"/>
-          </a:solidFill>
-          <a:ln>
-            <a:noFill/>
-          </a:ln>
-        </p:spPr>
-        <p:style>
-          <a:lnRef idx="2">
-            <a:schemeClr val="accent1">
-              <a:shade val="50000"/>
-            </a:schemeClr>
-          </a:lnRef>
-          <a:fillRef idx="1">
-            <a:schemeClr val="accent1"/>
-          </a:fillRef>
-          <a:effectRef idx="0">
-            <a:schemeClr val="accent1"/>
-          </a:effectRef>
-          <a:fontRef idx="minor">
-            <a:schemeClr val="lt1"/>
-          </a:fontRef>
-        </p:style>
-        <p:txBody>
-          <a:bodyPr rtlCol="0" anchor="ctr"/>
-          <a:lstStyle/>
-          <a:p>
-            <a:pPr algn="ctr"/>
-            <a:endParaRPr lang="en-US"/>
-          </a:p>
-        </p:txBody>
-      </p:sp>
-      <p:sp>
-        <p:nvSpPr>
-          <p:cNvPr id="63" name="TextBox 21"/>
-          <p:cNvSpPr txBox="1"/>
-          <p:nvPr/>
-        </p:nvSpPr>
-        <p:spPr>
-          <a:xfrm>
-            <a:off x="539551" y="1469976"/>
-            <a:ext cx="720082" cy="461665"/>
-          </a:xfrm>
-          <a:prstGeom prst="rect">
-            <a:avLst/>
-          </a:prstGeom>
-          <a:noFill/>
-        </p:spPr>
-        <p:txBody>
-          <a:bodyPr wrap="square" rtlCol="0" anchor="ctr">
-            <a:spAutoFit/>
-          </a:bodyPr>
-          <a:lstStyle/>
-          <a:p>
-            <a:pPr algn="ctr"/>
-            <a:r>
-              <a:rPr lang="en-US" altLang="ko-KR" sz="2400" b="1" dirty="0">
-                <a:solidFill>
-                  <a:schemeClr val="bg1"/>
-                </a:solidFill>
-                <a:cs typeface="Arial" pitchFamily="34" charset="0"/>
-              </a:rPr>
-              <a:t>01</a:t>
-            </a:r>
-            <a:endParaRPr lang="ko-KR" altLang="en-US" sz="2400" b="1" dirty="0">
-              <a:solidFill>
-                <a:schemeClr val="bg1"/>
-              </a:solidFill>
-              <a:cs typeface="Arial" pitchFamily="34" charset="0"/>
-            </a:endParaRPr>
-          </a:p>
-        </p:txBody>
-      </p:sp>
       <p:sp>
         <p:nvSpPr>
           <p:cNvPr id="26" name="Rectangle 3"/>
@@ -37979,6 +37781,93 @@
               <a:solidFill>
                 <a:schemeClr val="tx1"/>
               </a:solidFill>
+            </a:endParaRPr>
+          </a:p>
+        </p:txBody>
+      </p:sp>
+      <p:sp>
+        <p:nvSpPr>
+          <p:cNvPr id="13" name="Oval 4"/>
+          <p:cNvSpPr/>
+          <p:nvPr/>
+        </p:nvSpPr>
+        <p:spPr>
+          <a:xfrm>
+            <a:off x="601593" y="1431351"/>
+            <a:ext cx="540000" cy="540000"/>
+          </a:xfrm>
+          <a:prstGeom prst="ellipse">
+            <a:avLst/>
+          </a:prstGeom>
+          <a:solidFill>
+            <a:schemeClr val="accent1"/>
+          </a:solidFill>
+          <a:ln>
+            <a:noFill/>
+          </a:ln>
+        </p:spPr>
+        <p:style>
+          <a:lnRef idx="2">
+            <a:schemeClr val="accent1">
+              <a:shade val="50000"/>
+            </a:schemeClr>
+          </a:lnRef>
+          <a:fillRef idx="1">
+            <a:schemeClr val="accent1"/>
+          </a:fillRef>
+          <a:effectRef idx="0">
+            <a:schemeClr val="accent1"/>
+          </a:effectRef>
+          <a:fontRef idx="minor">
+            <a:schemeClr val="lt1"/>
+          </a:fontRef>
+        </p:style>
+        <p:txBody>
+          <a:bodyPr rtlCol="0" anchor="ctr"/>
+          <a:lstStyle/>
+          <a:p>
+            <a:pPr algn="ctr"/>
+            <a:endParaRPr lang="en-US"/>
+          </a:p>
+        </p:txBody>
+      </p:sp>
+      <p:sp>
+        <p:nvSpPr>
+          <p:cNvPr id="14" name="TextBox 21"/>
+          <p:cNvSpPr txBox="1"/>
+          <p:nvPr/>
+        </p:nvSpPr>
+        <p:spPr>
+          <a:xfrm>
+            <a:off x="610737" y="1510085"/>
+            <a:ext cx="540000" cy="360000"/>
+          </a:xfrm>
+          <a:prstGeom prst="rect">
+            <a:avLst/>
+          </a:prstGeom>
+          <a:noFill/>
+        </p:spPr>
+        <p:txBody>
+          <a:bodyPr wrap="square" rtlCol="0" anchor="ctr">
+            <a:spAutoFit/>
+          </a:bodyPr>
+          <a:lstStyle/>
+          <a:p>
+            <a:pPr algn="ctr"/>
+            <a:r>
+              <a:rPr lang="en-US" altLang="ko-KR" sz="2400" b="1" dirty="0">
+                <a:solidFill>
+                  <a:schemeClr val="bg1"/>
+                </a:solidFill>
+                <a:cs typeface="Arial" pitchFamily="34" charset="0"/>
+              </a:rPr>
+              <a:t>01</a:t>
+            </a:r>
+            <a:endParaRPr lang="ko-KR" altLang="en-US" sz="2400" b="1" dirty="0">
+              <a:solidFill>
+                <a:schemeClr val="bg1"/>
+              </a:solidFill>
+              <a:cs typeface="Arial" pitchFamily="34" charset="0"/>
             </a:endParaRPr>
           </a:p>
         </p:txBody>
@@ -39678,93 +39567,6 @@
           <a:chExt cx="0" cy="0"/>
         </a:xfrm>
       </p:grpSpPr>
-      <p:sp>
-        <p:nvSpPr>
-          <p:cNvPr id="28" name="Oval 4"/>
-          <p:cNvSpPr/>
-          <p:nvPr/>
-        </p:nvSpPr>
-        <p:spPr>
-          <a:xfrm>
-            <a:off x="539552" y="1274277"/>
-            <a:ext cx="720080" cy="720080"/>
-          </a:xfrm>
-          <a:prstGeom prst="ellipse">
-            <a:avLst/>
-          </a:prstGeom>
-          <a:solidFill>
-            <a:schemeClr val="accent1"/>
-          </a:solidFill>
-          <a:ln>
-            <a:noFill/>
-          </a:ln>
-        </p:spPr>
-        <p:style>
-          <a:lnRef idx="2">
-            <a:schemeClr val="accent1">
-              <a:shade val="50000"/>
-            </a:schemeClr>
-          </a:lnRef>
-          <a:fillRef idx="1">
-            <a:schemeClr val="accent1"/>
-          </a:fillRef>
-          <a:effectRef idx="0">
-            <a:schemeClr val="accent1"/>
-          </a:effectRef>
-          <a:fontRef idx="minor">
-            <a:schemeClr val="lt1"/>
-          </a:fontRef>
-        </p:style>
-        <p:txBody>
-          <a:bodyPr rtlCol="0" anchor="ctr"/>
-          <a:lstStyle/>
-          <a:p>
-            <a:pPr algn="ctr"/>
-            <a:endParaRPr lang="en-US"/>
-          </a:p>
-        </p:txBody>
-      </p:sp>
-      <p:sp>
-        <p:nvSpPr>
-          <p:cNvPr id="44" name="TextBox 21"/>
-          <p:cNvSpPr txBox="1"/>
-          <p:nvPr/>
-        </p:nvSpPr>
-        <p:spPr>
-          <a:xfrm>
-            <a:off x="539551" y="1403485"/>
-            <a:ext cx="720082" cy="461665"/>
-          </a:xfrm>
-          <a:prstGeom prst="rect">
-            <a:avLst/>
-          </a:prstGeom>
-          <a:noFill/>
-        </p:spPr>
-        <p:txBody>
-          <a:bodyPr wrap="square" rtlCol="0" anchor="ctr">
-            <a:spAutoFit/>
-          </a:bodyPr>
-          <a:lstStyle/>
-          <a:p>
-            <a:pPr algn="ctr"/>
-            <a:r>
-              <a:rPr lang="en-US" altLang="ko-KR" sz="2400" b="1" dirty="0">
-                <a:solidFill>
-                  <a:schemeClr val="bg1"/>
-                </a:solidFill>
-                <a:cs typeface="Arial" pitchFamily="34" charset="0"/>
-              </a:rPr>
-              <a:t>01</a:t>
-            </a:r>
-            <a:endParaRPr lang="ko-KR" altLang="en-US" sz="2400" b="1" dirty="0">
-              <a:solidFill>
-                <a:schemeClr val="bg1"/>
-              </a:solidFill>
-              <a:cs typeface="Arial" pitchFamily="34" charset="0"/>
-            </a:endParaRPr>
-          </a:p>
-        </p:txBody>
-      </p:sp>
       <p:pic>
         <p:nvPicPr>
           <p:cNvPr id="57" name="Imagen 56"/>
@@ -39795,93 +39597,6 @@
           </a:prstGeom>
         </p:spPr>
       </p:pic>
-      <p:sp>
-        <p:nvSpPr>
-          <p:cNvPr id="61" name="Oval 4"/>
-          <p:cNvSpPr/>
-          <p:nvPr/>
-        </p:nvSpPr>
-        <p:spPr>
-          <a:xfrm>
-            <a:off x="539552" y="1268760"/>
-            <a:ext cx="720080" cy="720080"/>
-          </a:xfrm>
-          <a:prstGeom prst="ellipse">
-            <a:avLst/>
-          </a:prstGeom>
-          <a:solidFill>
-            <a:schemeClr val="accent1"/>
-          </a:solidFill>
-          <a:ln>
-            <a:noFill/>
-          </a:ln>
-        </p:spPr>
-        <p:style>
-          <a:lnRef idx="2">
-            <a:schemeClr val="accent1">
-              <a:shade val="50000"/>
-            </a:schemeClr>
-          </a:lnRef>
-          <a:fillRef idx="1">
-            <a:schemeClr val="accent1"/>
-          </a:fillRef>
-          <a:effectRef idx="0">
-            <a:schemeClr val="accent1"/>
-          </a:effectRef>
-          <a:fontRef idx="minor">
-            <a:schemeClr val="lt1"/>
-          </a:fontRef>
-        </p:style>
-        <p:txBody>
-          <a:bodyPr rtlCol="0" anchor="ctr"/>
-          <a:lstStyle/>
-          <a:p>
-            <a:pPr algn="ctr"/>
-            <a:endParaRPr lang="en-US"/>
-          </a:p>
-        </p:txBody>
-      </p:sp>
-      <p:sp>
-        <p:nvSpPr>
-          <p:cNvPr id="63" name="TextBox 21"/>
-          <p:cNvSpPr txBox="1"/>
-          <p:nvPr/>
-        </p:nvSpPr>
-        <p:spPr>
-          <a:xfrm>
-            <a:off x="539551" y="1397968"/>
-            <a:ext cx="720082" cy="461665"/>
-          </a:xfrm>
-          <a:prstGeom prst="rect">
-            <a:avLst/>
-          </a:prstGeom>
-          <a:noFill/>
-        </p:spPr>
-        <p:txBody>
-          <a:bodyPr wrap="square" rtlCol="0" anchor="ctr">
-            <a:spAutoFit/>
-          </a:bodyPr>
-          <a:lstStyle/>
-          <a:p>
-            <a:pPr algn="ctr"/>
-            <a:r>
-              <a:rPr lang="en-US" altLang="ko-KR" sz="2400" b="1" dirty="0" smtClean="0">
-                <a:solidFill>
-                  <a:schemeClr val="bg1"/>
-                </a:solidFill>
-                <a:cs typeface="Arial" pitchFamily="34" charset="0"/>
-              </a:rPr>
-              <a:t>02</a:t>
-            </a:r>
-            <a:endParaRPr lang="ko-KR" altLang="en-US" sz="2400" b="1" dirty="0">
-              <a:solidFill>
-                <a:schemeClr val="bg1"/>
-              </a:solidFill>
-              <a:cs typeface="Arial" pitchFamily="34" charset="0"/>
-            </a:endParaRPr>
-          </a:p>
-        </p:txBody>
-      </p:sp>
       <p:sp>
         <p:nvSpPr>
           <p:cNvPr id="26" name="Rectangle 3"/>
@@ -41644,53 +41359,16 @@
           </a:p>
         </p:txBody>
       </p:sp>
-    </p:spTree>
-    <p:extLst>
-      <p:ext uri="{BB962C8B-B14F-4D97-AF65-F5344CB8AC3E}">
-        <p14:creationId xmlns:p14="http://schemas.microsoft.com/office/powerpoint/2010/main" val="17910887"/>
-      </p:ext>
-    </p:extLst>
-  </p:cSld>
-  <p:clrMapOvr>
-    <a:masterClrMapping/>
-  </p:clrMapOvr>
-  <p:timing>
-    <p:tnLst>
-      <p:par>
-        <p:cTn id="1" dur="indefinite" restart="never" nodeType="tmRoot"/>
-      </p:par>
-    </p:tnLst>
-  </p:timing>
-</p:sld>
-</file>
-
-<file path=ppt/slides/slide6.xml><?xml version="1.0" encoding="utf-8"?>
-<p:sld xmlns:a="http://schemas.openxmlformats.org/drawingml/2006/main" xmlns:r="http://schemas.openxmlformats.org/officeDocument/2006/relationships" xmlns:p="http://schemas.openxmlformats.org/presentationml/2006/main">
-  <p:cSld>
-    <p:spTree>
-      <p:nvGrpSpPr>
-        <p:cNvPr id="1" name=""/>
-        <p:cNvGrpSpPr/>
-        <p:nvPr/>
-      </p:nvGrpSpPr>
-      <p:grpSpPr>
-        <a:xfrm>
-          <a:off x="0" y="0"/>
-          <a:ext cx="0" cy="0"/>
-          <a:chOff x="0" y="0"/>
-          <a:chExt cx="0" cy="0"/>
-        </a:xfrm>
-      </p:grpSpPr>
       <p:sp>
         <p:nvSpPr>
-          <p:cNvPr id="28" name="Oval 4"/>
+          <p:cNvPr id="16" name="Oval 4"/>
           <p:cNvSpPr/>
           <p:nvPr/>
         </p:nvSpPr>
         <p:spPr>
           <a:xfrm>
-            <a:off x="539552" y="1274277"/>
-            <a:ext cx="720080" cy="720080"/>
+            <a:off x="629593" y="1358800"/>
+            <a:ext cx="540000" cy="540000"/>
           </a:xfrm>
           <a:prstGeom prst="ellipse">
             <a:avLst/>
@@ -41729,14 +41407,14 @@
       </p:sp>
       <p:sp>
         <p:nvSpPr>
-          <p:cNvPr id="44" name="TextBox 21"/>
+          <p:cNvPr id="17" name="TextBox 21"/>
           <p:cNvSpPr txBox="1"/>
           <p:nvPr/>
         </p:nvSpPr>
         <p:spPr>
           <a:xfrm>
-            <a:off x="539551" y="1403485"/>
-            <a:ext cx="720082" cy="461665"/>
+            <a:off x="629593" y="1397967"/>
+            <a:ext cx="540000" cy="461665"/>
           </a:xfrm>
           <a:prstGeom prst="rect">
             <a:avLst/>
@@ -41751,13 +41429,13 @@
           <a:p>
             <a:pPr algn="ctr"/>
             <a:r>
-              <a:rPr lang="en-US" altLang="ko-KR" sz="2400" b="1" dirty="0">
+              <a:rPr lang="en-US" altLang="ko-KR" sz="2400" b="1" dirty="0" smtClean="0">
                 <a:solidFill>
                   <a:schemeClr val="bg1"/>
                 </a:solidFill>
                 <a:cs typeface="Arial" pitchFamily="34" charset="0"/>
               </a:rPr>
-              <a:t>01</a:t>
+              <a:t>02</a:t>
             </a:r>
             <a:endParaRPr lang="ko-KR" altLang="en-US" sz="2400" b="1" dirty="0">
               <a:solidFill>
@@ -41768,6 +41446,43 @@
           </a:p>
         </p:txBody>
       </p:sp>
+    </p:spTree>
+    <p:extLst>
+      <p:ext uri="{BB962C8B-B14F-4D97-AF65-F5344CB8AC3E}">
+        <p14:creationId xmlns:p14="http://schemas.microsoft.com/office/powerpoint/2010/main" val="17910887"/>
+      </p:ext>
+    </p:extLst>
+  </p:cSld>
+  <p:clrMapOvr>
+    <a:masterClrMapping/>
+  </p:clrMapOvr>
+  <p:timing>
+    <p:tnLst>
+      <p:par>
+        <p:cTn id="1" dur="indefinite" restart="never" nodeType="tmRoot"/>
+      </p:par>
+    </p:tnLst>
+  </p:timing>
+</p:sld>
+</file>
+
+<file path=ppt/slides/slide6.xml><?xml version="1.0" encoding="utf-8"?>
+<p:sld xmlns:a="http://schemas.openxmlformats.org/drawingml/2006/main" xmlns:r="http://schemas.openxmlformats.org/officeDocument/2006/relationships" xmlns:p="http://schemas.openxmlformats.org/presentationml/2006/main">
+  <p:cSld>
+    <p:spTree>
+      <p:nvGrpSpPr>
+        <p:cNvPr id="1" name=""/>
+        <p:cNvGrpSpPr/>
+        <p:nvPr/>
+      </p:nvGrpSpPr>
+      <p:grpSpPr>
+        <a:xfrm>
+          <a:off x="0" y="0"/>
+          <a:ext cx="0" cy="0"/>
+          <a:chOff x="0" y="0"/>
+          <a:chExt cx="0" cy="0"/>
+        </a:xfrm>
+      </p:grpSpPr>
       <p:pic>
         <p:nvPicPr>
           <p:cNvPr id="57" name="Imagen 56"/>
@@ -41798,93 +41513,6 @@
           </a:prstGeom>
         </p:spPr>
       </p:pic>
-      <p:sp>
-        <p:nvSpPr>
-          <p:cNvPr id="61" name="Oval 4"/>
-          <p:cNvSpPr/>
-          <p:nvPr/>
-        </p:nvSpPr>
-        <p:spPr>
-          <a:xfrm>
-            <a:off x="539552" y="1268760"/>
-            <a:ext cx="720080" cy="720080"/>
-          </a:xfrm>
-          <a:prstGeom prst="ellipse">
-            <a:avLst/>
-          </a:prstGeom>
-          <a:solidFill>
-            <a:schemeClr val="accent1"/>
-          </a:solidFill>
-          <a:ln>
-            <a:noFill/>
-          </a:ln>
-        </p:spPr>
-        <p:style>
-          <a:lnRef idx="2">
-            <a:schemeClr val="accent1">
-              <a:shade val="50000"/>
-            </a:schemeClr>
-          </a:lnRef>
-          <a:fillRef idx="1">
-            <a:schemeClr val="accent1"/>
-          </a:fillRef>
-          <a:effectRef idx="0">
-            <a:schemeClr val="accent1"/>
-          </a:effectRef>
-          <a:fontRef idx="minor">
-            <a:schemeClr val="lt1"/>
-          </a:fontRef>
-        </p:style>
-        <p:txBody>
-          <a:bodyPr rtlCol="0" anchor="ctr"/>
-          <a:lstStyle/>
-          <a:p>
-            <a:pPr algn="ctr"/>
-            <a:endParaRPr lang="en-US"/>
-          </a:p>
-        </p:txBody>
-      </p:sp>
-      <p:sp>
-        <p:nvSpPr>
-          <p:cNvPr id="63" name="TextBox 21"/>
-          <p:cNvSpPr txBox="1"/>
-          <p:nvPr/>
-        </p:nvSpPr>
-        <p:spPr>
-          <a:xfrm>
-            <a:off x="539551" y="1397968"/>
-            <a:ext cx="720082" cy="461665"/>
-          </a:xfrm>
-          <a:prstGeom prst="rect">
-            <a:avLst/>
-          </a:prstGeom>
-          <a:noFill/>
-        </p:spPr>
-        <p:txBody>
-          <a:bodyPr wrap="square" rtlCol="0" anchor="ctr">
-            <a:spAutoFit/>
-          </a:bodyPr>
-          <a:lstStyle/>
-          <a:p>
-            <a:pPr algn="ctr"/>
-            <a:r>
-              <a:rPr lang="en-US" altLang="ko-KR" sz="2400" b="1" dirty="0" smtClean="0">
-                <a:solidFill>
-                  <a:schemeClr val="bg1"/>
-                </a:solidFill>
-                <a:cs typeface="Arial" pitchFamily="34" charset="0"/>
-              </a:rPr>
-              <a:t>02</a:t>
-            </a:r>
-            <a:endParaRPr lang="ko-KR" altLang="en-US" sz="2400" b="1" dirty="0">
-              <a:solidFill>
-                <a:schemeClr val="bg1"/>
-              </a:solidFill>
-              <a:cs typeface="Arial" pitchFamily="34" charset="0"/>
-            </a:endParaRPr>
-          </a:p>
-        </p:txBody>
-      </p:sp>
       <p:sp>
         <p:nvSpPr>
           <p:cNvPr id="26" name="Rectangle 3"/>
@@ -43656,53 +43284,16 @@
           </a:p>
         </p:txBody>
       </p:sp>
-    </p:spTree>
-    <p:extLst>
-      <p:ext uri="{BB962C8B-B14F-4D97-AF65-F5344CB8AC3E}">
-        <p14:creationId xmlns:p14="http://schemas.microsoft.com/office/powerpoint/2010/main" val="2958267380"/>
-      </p:ext>
-    </p:extLst>
-  </p:cSld>
-  <p:clrMapOvr>
-    <a:masterClrMapping/>
-  </p:clrMapOvr>
-  <p:timing>
-    <p:tnLst>
-      <p:par>
-        <p:cTn id="1" dur="indefinite" restart="never" nodeType="tmRoot"/>
-      </p:par>
-    </p:tnLst>
-  </p:timing>
-</p:sld>
-</file>
-
-<file path=ppt/slides/slide7.xml><?xml version="1.0" encoding="utf-8"?>
-<p:sld xmlns:a="http://schemas.openxmlformats.org/drawingml/2006/main" xmlns:r="http://schemas.openxmlformats.org/officeDocument/2006/relationships" xmlns:p="http://schemas.openxmlformats.org/presentationml/2006/main">
-  <p:cSld>
-    <p:spTree>
-      <p:nvGrpSpPr>
-        <p:cNvPr id="1" name=""/>
-        <p:cNvGrpSpPr/>
-        <p:nvPr/>
-      </p:nvGrpSpPr>
-      <p:grpSpPr>
-        <a:xfrm>
-          <a:off x="0" y="0"/>
-          <a:ext cx="0" cy="0"/>
-          <a:chOff x="0" y="0"/>
-          <a:chExt cx="0" cy="0"/>
-        </a:xfrm>
-      </p:grpSpPr>
       <p:sp>
         <p:nvSpPr>
-          <p:cNvPr id="28" name="Oval 4"/>
+          <p:cNvPr id="16" name="Oval 4"/>
           <p:cNvSpPr/>
           <p:nvPr/>
         </p:nvSpPr>
         <p:spPr>
           <a:xfrm>
-            <a:off x="539552" y="1274277"/>
-            <a:ext cx="720080" cy="720080"/>
+            <a:off x="629593" y="1358800"/>
+            <a:ext cx="540000" cy="540000"/>
           </a:xfrm>
           <a:prstGeom prst="ellipse">
             <a:avLst/>
@@ -43741,14 +43332,14 @@
       </p:sp>
       <p:sp>
         <p:nvSpPr>
-          <p:cNvPr id="44" name="TextBox 21"/>
+          <p:cNvPr id="17" name="TextBox 21"/>
           <p:cNvSpPr txBox="1"/>
           <p:nvPr/>
         </p:nvSpPr>
         <p:spPr>
           <a:xfrm>
-            <a:off x="539551" y="1403485"/>
-            <a:ext cx="720082" cy="461665"/>
+            <a:off x="629593" y="1397967"/>
+            <a:ext cx="540000" cy="461665"/>
           </a:xfrm>
           <a:prstGeom prst="rect">
             <a:avLst/>
@@ -43763,13 +43354,13 @@
           <a:p>
             <a:pPr algn="ctr"/>
             <a:r>
-              <a:rPr lang="en-US" altLang="ko-KR" sz="2400" b="1" dirty="0">
+              <a:rPr lang="en-US" altLang="ko-KR" sz="2400" b="1" dirty="0" smtClean="0">
                 <a:solidFill>
                   <a:schemeClr val="bg1"/>
                 </a:solidFill>
                 <a:cs typeface="Arial" pitchFamily="34" charset="0"/>
               </a:rPr>
-              <a:t>01</a:t>
+              <a:t>02</a:t>
             </a:r>
             <a:endParaRPr lang="ko-KR" altLang="en-US" sz="2400" b="1" dirty="0">
               <a:solidFill>
@@ -43780,6 +43371,43 @@
           </a:p>
         </p:txBody>
       </p:sp>
+    </p:spTree>
+    <p:extLst>
+      <p:ext uri="{BB962C8B-B14F-4D97-AF65-F5344CB8AC3E}">
+        <p14:creationId xmlns:p14="http://schemas.microsoft.com/office/powerpoint/2010/main" val="2958267380"/>
+      </p:ext>
+    </p:extLst>
+  </p:cSld>
+  <p:clrMapOvr>
+    <a:masterClrMapping/>
+  </p:clrMapOvr>
+  <p:timing>
+    <p:tnLst>
+      <p:par>
+        <p:cTn id="1" dur="indefinite" restart="never" nodeType="tmRoot"/>
+      </p:par>
+    </p:tnLst>
+  </p:timing>
+</p:sld>
+</file>
+
+<file path=ppt/slides/slide7.xml><?xml version="1.0" encoding="utf-8"?>
+<p:sld xmlns:a="http://schemas.openxmlformats.org/drawingml/2006/main" xmlns:r="http://schemas.openxmlformats.org/officeDocument/2006/relationships" xmlns:p="http://schemas.openxmlformats.org/presentationml/2006/main">
+  <p:cSld>
+    <p:spTree>
+      <p:nvGrpSpPr>
+        <p:cNvPr id="1" name=""/>
+        <p:cNvGrpSpPr/>
+        <p:nvPr/>
+      </p:nvGrpSpPr>
+      <p:grpSpPr>
+        <a:xfrm>
+          <a:off x="0" y="0"/>
+          <a:ext cx="0" cy="0"/>
+          <a:chOff x="0" y="0"/>
+          <a:chExt cx="0" cy="0"/>
+        </a:xfrm>
+      </p:grpSpPr>
       <p:pic>
         <p:nvPicPr>
           <p:cNvPr id="57" name="Imagen 56"/>
@@ -43810,93 +43438,6 @@
           </a:prstGeom>
         </p:spPr>
       </p:pic>
-      <p:sp>
-        <p:nvSpPr>
-          <p:cNvPr id="61" name="Oval 4"/>
-          <p:cNvSpPr/>
-          <p:nvPr/>
-        </p:nvSpPr>
-        <p:spPr>
-          <a:xfrm>
-            <a:off x="539552" y="1268760"/>
-            <a:ext cx="720080" cy="720080"/>
-          </a:xfrm>
-          <a:prstGeom prst="ellipse">
-            <a:avLst/>
-          </a:prstGeom>
-          <a:solidFill>
-            <a:schemeClr val="accent1"/>
-          </a:solidFill>
-          <a:ln>
-            <a:noFill/>
-          </a:ln>
-        </p:spPr>
-        <p:style>
-          <a:lnRef idx="2">
-            <a:schemeClr val="accent1">
-              <a:shade val="50000"/>
-            </a:schemeClr>
-          </a:lnRef>
-          <a:fillRef idx="1">
-            <a:schemeClr val="accent1"/>
-          </a:fillRef>
-          <a:effectRef idx="0">
-            <a:schemeClr val="accent1"/>
-          </a:effectRef>
-          <a:fontRef idx="minor">
-            <a:schemeClr val="lt1"/>
-          </a:fontRef>
-        </p:style>
-        <p:txBody>
-          <a:bodyPr rtlCol="0" anchor="ctr"/>
-          <a:lstStyle/>
-          <a:p>
-            <a:pPr algn="ctr"/>
-            <a:endParaRPr lang="en-US"/>
-          </a:p>
-        </p:txBody>
-      </p:sp>
-      <p:sp>
-        <p:nvSpPr>
-          <p:cNvPr id="63" name="TextBox 21"/>
-          <p:cNvSpPr txBox="1"/>
-          <p:nvPr/>
-        </p:nvSpPr>
-        <p:spPr>
-          <a:xfrm>
-            <a:off x="539551" y="1397968"/>
-            <a:ext cx="720082" cy="461665"/>
-          </a:xfrm>
-          <a:prstGeom prst="rect">
-            <a:avLst/>
-          </a:prstGeom>
-          <a:noFill/>
-        </p:spPr>
-        <p:txBody>
-          <a:bodyPr wrap="square" rtlCol="0" anchor="ctr">
-            <a:spAutoFit/>
-          </a:bodyPr>
-          <a:lstStyle/>
-          <a:p>
-            <a:pPr algn="ctr"/>
-            <a:r>
-              <a:rPr lang="en-US" altLang="ko-KR" sz="2400" b="1" dirty="0" smtClean="0">
-                <a:solidFill>
-                  <a:schemeClr val="bg1"/>
-                </a:solidFill>
-                <a:cs typeface="Arial" pitchFamily="34" charset="0"/>
-              </a:rPr>
-              <a:t>03</a:t>
-            </a:r>
-            <a:endParaRPr lang="ko-KR" altLang="en-US" sz="2400" b="1" dirty="0">
-              <a:solidFill>
-                <a:schemeClr val="bg1"/>
-              </a:solidFill>
-              <a:cs typeface="Arial" pitchFamily="34" charset="0"/>
-            </a:endParaRPr>
-          </a:p>
-        </p:txBody>
-      </p:sp>
       <p:sp>
         <p:nvSpPr>
           <p:cNvPr id="26" name="Rectangle 3"/>
@@ -45633,53 +45174,16 @@
           </a:p>
         </p:txBody>
       </p:sp>
-    </p:spTree>
-    <p:extLst>
-      <p:ext uri="{BB962C8B-B14F-4D97-AF65-F5344CB8AC3E}">
-        <p14:creationId xmlns:p14="http://schemas.microsoft.com/office/powerpoint/2010/main" val="411206030"/>
-      </p:ext>
-    </p:extLst>
-  </p:cSld>
-  <p:clrMapOvr>
-    <a:masterClrMapping/>
-  </p:clrMapOvr>
-  <p:timing>
-    <p:tnLst>
-      <p:par>
-        <p:cTn id="1" dur="indefinite" restart="never" nodeType="tmRoot"/>
-      </p:par>
-    </p:tnLst>
-  </p:timing>
-</p:sld>
-</file>
-
-<file path=ppt/slides/slide8.xml><?xml version="1.0" encoding="utf-8"?>
-<p:sld xmlns:a="http://schemas.openxmlformats.org/drawingml/2006/main" xmlns:r="http://schemas.openxmlformats.org/officeDocument/2006/relationships" xmlns:p="http://schemas.openxmlformats.org/presentationml/2006/main">
-  <p:cSld>
-    <p:spTree>
-      <p:nvGrpSpPr>
-        <p:cNvPr id="1" name=""/>
-        <p:cNvGrpSpPr/>
-        <p:nvPr/>
-      </p:nvGrpSpPr>
-      <p:grpSpPr>
-        <a:xfrm>
-          <a:off x="0" y="0"/>
-          <a:ext cx="0" cy="0"/>
-          <a:chOff x="0" y="0"/>
-          <a:chExt cx="0" cy="0"/>
-        </a:xfrm>
-      </p:grpSpPr>
       <p:sp>
         <p:nvSpPr>
-          <p:cNvPr id="28" name="Oval 4"/>
+          <p:cNvPr id="15" name="Oval 4"/>
           <p:cNvSpPr/>
           <p:nvPr/>
         </p:nvSpPr>
         <p:spPr>
           <a:xfrm>
-            <a:off x="539552" y="1274277"/>
-            <a:ext cx="720080" cy="720080"/>
+            <a:off x="629593" y="1358800"/>
+            <a:ext cx="540000" cy="540000"/>
           </a:xfrm>
           <a:prstGeom prst="ellipse">
             <a:avLst/>
@@ -45718,14 +45222,14 @@
       </p:sp>
       <p:sp>
         <p:nvSpPr>
-          <p:cNvPr id="44" name="TextBox 21"/>
+          <p:cNvPr id="16" name="TextBox 21"/>
           <p:cNvSpPr txBox="1"/>
           <p:nvPr/>
         </p:nvSpPr>
         <p:spPr>
           <a:xfrm>
-            <a:off x="539551" y="1403485"/>
-            <a:ext cx="720082" cy="461665"/>
+            <a:off x="629593" y="1397967"/>
+            <a:ext cx="540000" cy="461665"/>
           </a:xfrm>
           <a:prstGeom prst="rect">
             <a:avLst/>
@@ -45740,13 +45244,13 @@
           <a:p>
             <a:pPr algn="ctr"/>
             <a:r>
-              <a:rPr lang="en-US" altLang="ko-KR" sz="2400" b="1" dirty="0">
+              <a:rPr lang="en-US" altLang="ko-KR" sz="2400" b="1" dirty="0" smtClean="0">
                 <a:solidFill>
                   <a:schemeClr val="bg1"/>
                 </a:solidFill>
                 <a:cs typeface="Arial" pitchFamily="34" charset="0"/>
               </a:rPr>
-              <a:t>01</a:t>
+              <a:t>03</a:t>
             </a:r>
             <a:endParaRPr lang="ko-KR" altLang="en-US" sz="2400" b="1" dirty="0">
               <a:solidFill>
@@ -45757,6 +45261,43 @@
           </a:p>
         </p:txBody>
       </p:sp>
+    </p:spTree>
+    <p:extLst>
+      <p:ext uri="{BB962C8B-B14F-4D97-AF65-F5344CB8AC3E}">
+        <p14:creationId xmlns:p14="http://schemas.microsoft.com/office/powerpoint/2010/main" val="411206030"/>
+      </p:ext>
+    </p:extLst>
+  </p:cSld>
+  <p:clrMapOvr>
+    <a:masterClrMapping/>
+  </p:clrMapOvr>
+  <p:timing>
+    <p:tnLst>
+      <p:par>
+        <p:cTn id="1" dur="indefinite" restart="never" nodeType="tmRoot"/>
+      </p:par>
+    </p:tnLst>
+  </p:timing>
+</p:sld>
+</file>
+
+<file path=ppt/slides/slide8.xml><?xml version="1.0" encoding="utf-8"?>
+<p:sld xmlns:a="http://schemas.openxmlformats.org/drawingml/2006/main" xmlns:r="http://schemas.openxmlformats.org/officeDocument/2006/relationships" xmlns:p="http://schemas.openxmlformats.org/presentationml/2006/main">
+  <p:cSld>
+    <p:spTree>
+      <p:nvGrpSpPr>
+        <p:cNvPr id="1" name=""/>
+        <p:cNvGrpSpPr/>
+        <p:nvPr/>
+      </p:nvGrpSpPr>
+      <p:grpSpPr>
+        <a:xfrm>
+          <a:off x="0" y="0"/>
+          <a:ext cx="0" cy="0"/>
+          <a:chOff x="0" y="0"/>
+          <a:chExt cx="0" cy="0"/>
+        </a:xfrm>
+      </p:grpSpPr>
       <p:pic>
         <p:nvPicPr>
           <p:cNvPr id="57" name="Imagen 56"/>
@@ -45787,93 +45328,6 @@
           </a:prstGeom>
         </p:spPr>
       </p:pic>
-      <p:sp>
-        <p:nvSpPr>
-          <p:cNvPr id="61" name="Oval 4"/>
-          <p:cNvSpPr/>
-          <p:nvPr/>
-        </p:nvSpPr>
-        <p:spPr>
-          <a:xfrm>
-            <a:off x="539552" y="1268760"/>
-            <a:ext cx="720080" cy="720080"/>
-          </a:xfrm>
-          <a:prstGeom prst="ellipse">
-            <a:avLst/>
-          </a:prstGeom>
-          <a:solidFill>
-            <a:schemeClr val="accent1"/>
-          </a:solidFill>
-          <a:ln>
-            <a:noFill/>
-          </a:ln>
-        </p:spPr>
-        <p:style>
-          <a:lnRef idx="2">
-            <a:schemeClr val="accent1">
-              <a:shade val="50000"/>
-            </a:schemeClr>
-          </a:lnRef>
-          <a:fillRef idx="1">
-            <a:schemeClr val="accent1"/>
-          </a:fillRef>
-          <a:effectRef idx="0">
-            <a:schemeClr val="accent1"/>
-          </a:effectRef>
-          <a:fontRef idx="minor">
-            <a:schemeClr val="lt1"/>
-          </a:fontRef>
-        </p:style>
-        <p:txBody>
-          <a:bodyPr rtlCol="0" anchor="ctr"/>
-          <a:lstStyle/>
-          <a:p>
-            <a:pPr algn="ctr"/>
-            <a:endParaRPr lang="en-US"/>
-          </a:p>
-        </p:txBody>
-      </p:sp>
-      <p:sp>
-        <p:nvSpPr>
-          <p:cNvPr id="63" name="TextBox 21"/>
-          <p:cNvSpPr txBox="1"/>
-          <p:nvPr/>
-        </p:nvSpPr>
-        <p:spPr>
-          <a:xfrm>
-            <a:off x="539551" y="1397968"/>
-            <a:ext cx="720082" cy="461665"/>
-          </a:xfrm>
-          <a:prstGeom prst="rect">
-            <a:avLst/>
-          </a:prstGeom>
-          <a:noFill/>
-        </p:spPr>
-        <p:txBody>
-          <a:bodyPr wrap="square" rtlCol="0" anchor="ctr">
-            <a:spAutoFit/>
-          </a:bodyPr>
-          <a:lstStyle/>
-          <a:p>
-            <a:pPr algn="ctr"/>
-            <a:r>
-              <a:rPr lang="en-US" altLang="ko-KR" sz="2400" b="1" dirty="0" smtClean="0">
-                <a:solidFill>
-                  <a:schemeClr val="bg1"/>
-                </a:solidFill>
-                <a:cs typeface="Arial" pitchFamily="34" charset="0"/>
-              </a:rPr>
-              <a:t>03</a:t>
-            </a:r>
-            <a:endParaRPr lang="ko-KR" altLang="en-US" sz="2400" b="1" dirty="0">
-              <a:solidFill>
-                <a:schemeClr val="bg1"/>
-              </a:solidFill>
-              <a:cs typeface="Arial" pitchFamily="34" charset="0"/>
-            </a:endParaRPr>
-          </a:p>
-        </p:txBody>
-      </p:sp>
       <p:sp>
         <p:nvSpPr>
           <p:cNvPr id="26" name="Rectangle 3"/>
@@ -47734,6 +47188,93 @@
           </a:p>
         </p:txBody>
       </p:sp>
+      <p:sp>
+        <p:nvSpPr>
+          <p:cNvPr id="15" name="Oval 4"/>
+          <p:cNvSpPr/>
+          <p:nvPr/>
+        </p:nvSpPr>
+        <p:spPr>
+          <a:xfrm>
+            <a:off x="629593" y="1358800"/>
+            <a:ext cx="540000" cy="540000"/>
+          </a:xfrm>
+          <a:prstGeom prst="ellipse">
+            <a:avLst/>
+          </a:prstGeom>
+          <a:solidFill>
+            <a:schemeClr val="accent1"/>
+          </a:solidFill>
+          <a:ln>
+            <a:noFill/>
+          </a:ln>
+        </p:spPr>
+        <p:style>
+          <a:lnRef idx="2">
+            <a:schemeClr val="accent1">
+              <a:shade val="50000"/>
+            </a:schemeClr>
+          </a:lnRef>
+          <a:fillRef idx="1">
+            <a:schemeClr val="accent1"/>
+          </a:fillRef>
+          <a:effectRef idx="0">
+            <a:schemeClr val="accent1"/>
+          </a:effectRef>
+          <a:fontRef idx="minor">
+            <a:schemeClr val="lt1"/>
+          </a:fontRef>
+        </p:style>
+        <p:txBody>
+          <a:bodyPr rtlCol="0" anchor="ctr"/>
+          <a:lstStyle/>
+          <a:p>
+            <a:pPr algn="ctr"/>
+            <a:endParaRPr lang="en-US"/>
+          </a:p>
+        </p:txBody>
+      </p:sp>
+      <p:sp>
+        <p:nvSpPr>
+          <p:cNvPr id="16" name="TextBox 21"/>
+          <p:cNvSpPr txBox="1"/>
+          <p:nvPr/>
+        </p:nvSpPr>
+        <p:spPr>
+          <a:xfrm>
+            <a:off x="629593" y="1397967"/>
+            <a:ext cx="540000" cy="461665"/>
+          </a:xfrm>
+          <a:prstGeom prst="rect">
+            <a:avLst/>
+          </a:prstGeom>
+          <a:noFill/>
+        </p:spPr>
+        <p:txBody>
+          <a:bodyPr wrap="square" rtlCol="0" anchor="ctr">
+            <a:spAutoFit/>
+          </a:bodyPr>
+          <a:lstStyle/>
+          <a:p>
+            <a:pPr algn="ctr"/>
+            <a:r>
+              <a:rPr lang="en-US" altLang="ko-KR" sz="2400" b="1" dirty="0" smtClean="0">
+                <a:solidFill>
+                  <a:schemeClr val="bg1"/>
+                </a:solidFill>
+                <a:cs typeface="Arial" pitchFamily="34" charset="0"/>
+              </a:rPr>
+              <a:t>03</a:t>
+            </a:r>
+            <a:endParaRPr lang="ko-KR" altLang="en-US" sz="2400" b="1" dirty="0">
+              <a:solidFill>
+                <a:schemeClr val="bg1"/>
+              </a:solidFill>
+              <a:cs typeface="Arial" pitchFamily="34" charset="0"/>
+            </a:endParaRPr>
+          </a:p>
+        </p:txBody>
+      </p:sp>
     </p:spTree>
     <p:extLst>
       <p:ext uri="{BB962C8B-B14F-4D97-AF65-F5344CB8AC3E}">
@@ -49061,93 +48602,6 @@
       </p:graphicFrame>
       <p:sp>
         <p:nvSpPr>
-          <p:cNvPr id="16" name="Oval 4"/>
-          <p:cNvSpPr/>
-          <p:nvPr/>
-        </p:nvSpPr>
-        <p:spPr>
-          <a:xfrm>
-            <a:off x="251521" y="1268760"/>
-            <a:ext cx="720080" cy="720080"/>
-          </a:xfrm>
-          <a:prstGeom prst="ellipse">
-            <a:avLst/>
-          </a:prstGeom>
-          <a:solidFill>
-            <a:schemeClr val="accent1"/>
-          </a:solidFill>
-          <a:ln>
-            <a:noFill/>
-          </a:ln>
-        </p:spPr>
-        <p:style>
-          <a:lnRef idx="2">
-            <a:schemeClr val="accent1">
-              <a:shade val="50000"/>
-            </a:schemeClr>
-          </a:lnRef>
-          <a:fillRef idx="1">
-            <a:schemeClr val="accent1"/>
-          </a:fillRef>
-          <a:effectRef idx="0">
-            <a:schemeClr val="accent1"/>
-          </a:effectRef>
-          <a:fontRef idx="minor">
-            <a:schemeClr val="lt1"/>
-          </a:fontRef>
-        </p:style>
-        <p:txBody>
-          <a:bodyPr rtlCol="0" anchor="ctr"/>
-          <a:lstStyle/>
-          <a:p>
-            <a:pPr algn="ctr"/>
-            <a:endParaRPr lang="en-US"/>
-          </a:p>
-        </p:txBody>
-      </p:sp>
-      <p:sp>
-        <p:nvSpPr>
-          <p:cNvPr id="17" name="TextBox 21"/>
-          <p:cNvSpPr txBox="1"/>
-          <p:nvPr/>
-        </p:nvSpPr>
-        <p:spPr>
-          <a:xfrm>
-            <a:off x="251520" y="1397968"/>
-            <a:ext cx="720082" cy="461665"/>
-          </a:xfrm>
-          <a:prstGeom prst="rect">
-            <a:avLst/>
-          </a:prstGeom>
-          <a:noFill/>
-        </p:spPr>
-        <p:txBody>
-          <a:bodyPr wrap="square" rtlCol="0" anchor="ctr">
-            <a:spAutoFit/>
-          </a:bodyPr>
-          <a:lstStyle/>
-          <a:p>
-            <a:pPr algn="ctr"/>
-            <a:r>
-              <a:rPr lang="en-US" altLang="ko-KR" sz="2400" b="1" dirty="0" smtClean="0">
-                <a:solidFill>
-                  <a:schemeClr val="bg1"/>
-                </a:solidFill>
-                <a:cs typeface="Arial" pitchFamily="34" charset="0"/>
-              </a:rPr>
-              <a:t>04</a:t>
-            </a:r>
-            <a:endParaRPr lang="ko-KR" altLang="en-US" sz="2400" b="1" dirty="0">
-              <a:solidFill>
-                <a:schemeClr val="bg1"/>
-              </a:solidFill>
-              <a:cs typeface="Arial" pitchFamily="34" charset="0"/>
-            </a:endParaRPr>
-          </a:p>
-        </p:txBody>
-      </p:sp>
-      <p:sp>
-        <p:nvSpPr>
           <p:cNvPr id="11" name="Rounded Rectangle 3"/>
           <p:cNvSpPr/>
           <p:nvPr/>
@@ -49266,6 +48720,93 @@
             </a:r>
             <a:endParaRPr lang="en-US" sz="2400" b="1" dirty="0">
               <a:latin typeface="Tahoma" charset="0"/>
+            </a:endParaRPr>
+          </a:p>
+        </p:txBody>
+      </p:sp>
+      <p:sp>
+        <p:nvSpPr>
+          <p:cNvPr id="13" name="Oval 4"/>
+          <p:cNvSpPr/>
+          <p:nvPr/>
+        </p:nvSpPr>
+        <p:spPr>
+          <a:xfrm>
+            <a:off x="359592" y="1340768"/>
+            <a:ext cx="540000" cy="540000"/>
+          </a:xfrm>
+          <a:prstGeom prst="ellipse">
+            <a:avLst/>
+          </a:prstGeom>
+          <a:solidFill>
+            <a:schemeClr val="accent1"/>
+          </a:solidFill>
+          <a:ln>
+            <a:noFill/>
+          </a:ln>
+        </p:spPr>
+        <p:style>
+          <a:lnRef idx="2">
+            <a:schemeClr val="accent1">
+              <a:shade val="50000"/>
+            </a:schemeClr>
+          </a:lnRef>
+          <a:fillRef idx="1">
+            <a:schemeClr val="accent1"/>
+          </a:fillRef>
+          <a:effectRef idx="0">
+            <a:schemeClr val="accent1"/>
+          </a:effectRef>
+          <a:fontRef idx="minor">
+            <a:schemeClr val="lt1"/>
+          </a:fontRef>
+        </p:style>
+        <p:txBody>
+          <a:bodyPr rtlCol="0" anchor="ctr"/>
+          <a:lstStyle/>
+          <a:p>
+            <a:pPr algn="ctr"/>
+            <a:endParaRPr lang="en-US"/>
+          </a:p>
+        </p:txBody>
+      </p:sp>
+      <p:sp>
+        <p:nvSpPr>
+          <p:cNvPr id="14" name="TextBox 21"/>
+          <p:cNvSpPr txBox="1"/>
+          <p:nvPr/>
+        </p:nvSpPr>
+        <p:spPr>
+          <a:xfrm>
+            <a:off x="359592" y="1379935"/>
+            <a:ext cx="540000" cy="461665"/>
+          </a:xfrm>
+          <a:prstGeom prst="rect">
+            <a:avLst/>
+          </a:prstGeom>
+          <a:noFill/>
+        </p:spPr>
+        <p:txBody>
+          <a:bodyPr wrap="square" rtlCol="0" anchor="ctr">
+            <a:spAutoFit/>
+          </a:bodyPr>
+          <a:lstStyle/>
+          <a:p>
+            <a:pPr algn="ctr"/>
+            <a:r>
+              <a:rPr lang="en-US" altLang="ko-KR" sz="2400" b="1" dirty="0" smtClean="0">
+                <a:solidFill>
+                  <a:schemeClr val="bg1"/>
+                </a:solidFill>
+                <a:cs typeface="Arial" pitchFamily="34" charset="0"/>
+              </a:rPr>
+              <a:t>04</a:t>
+            </a:r>
+            <a:endParaRPr lang="ko-KR" altLang="en-US" sz="2400" b="1" dirty="0">
+              <a:solidFill>
+                <a:schemeClr val="bg1"/>
+              </a:solidFill>
+              <a:cs typeface="Arial" pitchFamily="34" charset="0"/>
             </a:endParaRPr>
           </a:p>
         </p:txBody>

</xml_diff>